<commit_message>
Update slides for encoder-decoder models
</commit_message>
<xml_diff>
--- a/slides/18-encoder-decoder-models.pptx
+++ b/slides/18-encoder-decoder-models.pptx
@@ -5,13 +5,25 @@
     <p:sldMasterId id="2147483678" r:id="rId1"/>
   </p:sldMasterIdLst>
   <p:notesMasterIdLst>
-    <p:notesMasterId r:id="rId3"/>
+    <p:notesMasterId r:id="rId15"/>
   </p:notesMasterIdLst>
   <p:handoutMasterIdLst>
-    <p:handoutMasterId r:id="rId4"/>
+    <p:handoutMasterId r:id="rId16"/>
   </p:handoutMasterIdLst>
   <p:sldIdLst>
-    <p:sldId id="1777" r:id="rId2"/>
+    <p:sldId id="1787" r:id="rId2"/>
+    <p:sldId id="1789" r:id="rId3"/>
+    <p:sldId id="1788" r:id="rId4"/>
+    <p:sldId id="1790" r:id="rId5"/>
+    <p:sldId id="1791" r:id="rId6"/>
+    <p:sldId id="1792" r:id="rId7"/>
+    <p:sldId id="1793" r:id="rId8"/>
+    <p:sldId id="1794" r:id="rId9"/>
+    <p:sldId id="1795" r:id="rId10"/>
+    <p:sldId id="1796" r:id="rId11"/>
+    <p:sldId id="1797" r:id="rId12"/>
+    <p:sldId id="1798" r:id="rId13"/>
+    <p:sldId id="1799" r:id="rId14"/>
   </p:sldIdLst>
   <p:sldSz cx="9144000" cy="6858000" type="screen4x3"/>
   <p:notesSz cx="7315200" cy="9601200"/>
@@ -226,7 +238,7 @@
             <a:fld id="{D3E28C4F-4FE9-4D22-93D8-487A4D01D983}" type="datetimeFigureOut">
               <a:rPr lang="en-US" smtClean="0"/>
               <a:pPr/>
-              <a:t>3/18/20</a:t>
+              <a:t>1/8/2020</a:t>
             </a:fld>
             <a:endParaRPr lang="en-US"/>
           </a:p>
@@ -393,7 +405,7 @@
             <a:fld id="{EE18CB36-612C-4E4A-AC83-E89476AEC2BF}" type="datetimeFigureOut">
               <a:rPr lang="en-US" smtClean="0"/>
               <a:pPr/>
-              <a:t>3/18/20</a:t>
+              <a:t>1/8/2020</a:t>
             </a:fld>
             <a:endParaRPr lang="en-US"/>
           </a:p>
@@ -813,7 +825,7 @@
           <a:p>
             <a:fld id="{240CDC23-E565-C848-9AF6-12BD09C53D91}" type="datetimeFigureOut">
               <a:rPr lang="en-US" smtClean="0"/>
-              <a:t>3/18/20</a:t>
+              <a:t>1/8/2020</a:t>
             </a:fld>
             <a:endParaRPr lang="en-US"/>
           </a:p>
@@ -1058,7 +1070,7 @@
           <a:p>
             <a:fld id="{240CDC23-E565-C848-9AF6-12BD09C53D91}" type="datetimeFigureOut">
               <a:rPr lang="en-US" smtClean="0"/>
-              <a:t>3/18/20</a:t>
+              <a:t>1/8/2020</a:t>
             </a:fld>
             <a:endParaRPr lang="en-US"/>
           </a:p>
@@ -1140,7 +1152,7 @@
   <p:clrMapOvr>
     <a:masterClrMapping/>
   </p:clrMapOvr>
-  <p:extLst>
+  <p:extLst mod="1">
     <p:ext uri="{DCECCB84-F9BA-43D5-87BE-67443E8EF086}">
       <p15:sldGuideLst xmlns:p15="http://schemas.microsoft.com/office/powerpoint/2012/main">
         <p15:guide id="1" orient="horz" pos="2160">
@@ -1365,7 +1377,7 @@
           <a:p>
             <a:fld id="{240CDC23-E565-C848-9AF6-12BD09C53D91}" type="datetimeFigureOut">
               <a:rPr lang="en-US" smtClean="0"/>
-              <a:t>3/18/20</a:t>
+              <a:t>1/8/2020</a:t>
             </a:fld>
             <a:endParaRPr lang="en-US"/>
           </a:p>
@@ -1724,7 +1736,7 @@
           <a:p>
             <a:fld id="{240CDC23-E565-C848-9AF6-12BD09C53D91}" type="datetimeFigureOut">
               <a:rPr lang="en-US" smtClean="0"/>
-              <a:t>3/18/20</a:t>
+              <a:t>1/8/2020</a:t>
             </a:fld>
             <a:endParaRPr lang="en-US"/>
           </a:p>
@@ -2103,7 +2115,7 @@
           <a:p>
             <a:fld id="{240CDC23-E565-C848-9AF6-12BD09C53D91}" type="datetimeFigureOut">
               <a:rPr lang="en-US" smtClean="0"/>
-              <a:t>3/18/20</a:t>
+              <a:t>1/8/2020</a:t>
             </a:fld>
             <a:endParaRPr lang="en-US"/>
           </a:p>
@@ -2221,7 +2233,7 @@
           <a:p>
             <a:fld id="{240CDC23-E565-C848-9AF6-12BD09C53D91}" type="datetimeFigureOut">
               <a:rPr lang="en-US" smtClean="0"/>
-              <a:t>3/18/20</a:t>
+              <a:t>1/8/2020</a:t>
             </a:fld>
             <a:endParaRPr lang="en-US"/>
           </a:p>
@@ -2567,7 +2579,7 @@
           <a:p>
             <a:fld id="{240CDC23-E565-C848-9AF6-12BD09C53D91}" type="datetimeFigureOut">
               <a:rPr lang="en-US" smtClean="0"/>
-              <a:t>3/18/20</a:t>
+              <a:t>1/8/2020</a:t>
             </a:fld>
             <a:endParaRPr lang="en-US"/>
           </a:p>
@@ -2757,7 +2769,7 @@
           <a:p>
             <a:fld id="{240CDC23-E565-C848-9AF6-12BD09C53D91}" type="datetimeFigureOut">
               <a:rPr lang="en-US" smtClean="0"/>
-              <a:t>3/18/20</a:t>
+              <a:t>1/8/2020</a:t>
             </a:fld>
             <a:r>
               <a:rPr lang="en-US" dirty="0" err="1"/>
@@ -3270,7 +3282,7 @@
           <a:p>
             <a:fld id="{240CDC23-E565-C848-9AF6-12BD09C53D91}" type="datetimeFigureOut">
               <a:rPr lang="en-US" smtClean="0"/>
-              <a:t>3/18/20</a:t>
+              <a:t>1/8/2020</a:t>
             </a:fld>
             <a:endParaRPr lang="en-US"/>
           </a:p>
@@ -3764,10 +3776,15 @@
             <p:ph type="ctrTitle"/>
           </p:nvPr>
         </p:nvSpPr>
-        <p:spPr/>
+        <p:spPr>
+          <a:xfrm>
+            <a:off x="822960" y="304800"/>
+            <a:ext cx="7543800" cy="4020312"/>
+          </a:xfrm>
+        </p:spPr>
         <p:txBody>
           <a:bodyPr>
-            <a:normAutofit/>
+            <a:normAutofit fontScale="90000"/>
           </a:bodyPr>
           <a:lstStyle/>
           <a:p>
@@ -3777,7 +3794,22 @@
                   <a:srgbClr val="C00000"/>
                 </a:solidFill>
               </a:rPr>
-              <a:t>Encoder-Decoder Models</a:t>
+              <a:t>Encoder-Decoder Models, Attention,</a:t>
+            </a:r>
+            <a:br>
+              <a:rPr lang="en-US" dirty="0">
+                <a:solidFill>
+                  <a:srgbClr val="C00000"/>
+                </a:solidFill>
+              </a:rPr>
+            </a:br>
+            <a:r>
+              <a:rPr lang="en-US" dirty="0">
+                <a:solidFill>
+                  <a:srgbClr val="C00000"/>
+                </a:solidFill>
+              </a:rPr>
+              <a:t>and Contextual Embeddings</a:t>
             </a:r>
             <a:endParaRPr lang="en-US" dirty="0"/>
           </a:p>
@@ -3804,20 +3836,2509 @@
             </a:r>
             <a:r>
               <a:rPr lang="en-US" dirty="0"/>
-              <a:t> and Martin </a:t>
-            </a:r>
-            <a:r>
-              <a:rPr lang="en-US"/>
-              <a:t>Chapter 10</a:t>
-            </a:r>
-            <a:endParaRPr lang="en-US" dirty="0"/>
+              <a:t> and Martin Chapter 10</a:t>
+            </a:r>
           </a:p>
         </p:txBody>
       </p:sp>
     </p:spTree>
     <p:extLst>
       <p:ext uri="{BB962C8B-B14F-4D97-AF65-F5344CB8AC3E}">
-        <p14:creationId xmlns:p14="http://schemas.microsoft.com/office/powerpoint/2010/main" val="1388066370"/>
+        <p14:creationId xmlns:p14="http://schemas.microsoft.com/office/powerpoint/2010/main" val="781036126"/>
+      </p:ext>
+    </p:extLst>
+  </p:cSld>
+  <p:clrMapOvr>
+    <a:masterClrMapping/>
+  </p:clrMapOvr>
+</p:sld>
+</file>
+
+<file path=ppt/slides/slide10.xml><?xml version="1.0" encoding="utf-8"?>
+<p:sld xmlns:a="http://schemas.openxmlformats.org/drawingml/2006/main" xmlns:r="http://schemas.openxmlformats.org/officeDocument/2006/relationships" xmlns:p="http://schemas.openxmlformats.org/presentationml/2006/main">
+  <p:cSld>
+    <p:spTree>
+      <p:nvGrpSpPr>
+        <p:cNvPr id="1" name=""/>
+        <p:cNvGrpSpPr/>
+        <p:nvPr/>
+      </p:nvGrpSpPr>
+      <p:grpSpPr>
+        <a:xfrm>
+          <a:off x="0" y="0"/>
+          <a:ext cx="0" cy="0"/>
+          <a:chOff x="0" y="0"/>
+          <a:chExt cx="0" cy="0"/>
+        </a:xfrm>
+      </p:grpSpPr>
+      <p:sp>
+        <p:nvSpPr>
+          <p:cNvPr id="2" name="Title 1">
+            <a:extLst>
+              <a:ext uri="{FF2B5EF4-FFF2-40B4-BE49-F238E27FC236}">
+                <a16:creationId xmlns:a16="http://schemas.microsoft.com/office/drawing/2014/main" id="{1408017F-CF4C-4E45-85BE-9D0A81857715}"/>
+              </a:ext>
+            </a:extLst>
+          </p:cNvPr>
+          <p:cNvSpPr>
+            <a:spLocks noGrp="1"/>
+          </p:cNvSpPr>
+          <p:nvPr>
+            <p:ph type="title"/>
+          </p:nvPr>
+        </p:nvSpPr>
+        <p:spPr/>
+        <p:txBody>
+          <a:bodyPr/>
+          <a:lstStyle/>
+          <a:p>
+            <a:r>
+              <a:rPr lang="en-US" dirty="0"/>
+              <a:t>Attention mechanism</a:t>
+            </a:r>
+          </a:p>
+        </p:txBody>
+      </p:sp>
+      <mc:AlternateContent xmlns:mc="http://schemas.openxmlformats.org/markup-compatibility/2006" xmlns:a14="http://schemas.microsoft.com/office/drawing/2010/main">
+        <mc:Choice Requires="a14">
+          <p:sp>
+            <p:nvSpPr>
+              <p:cNvPr id="3" name="Content Placeholder 2">
+                <a:extLst>
+                  <a:ext uri="{FF2B5EF4-FFF2-40B4-BE49-F238E27FC236}">
+                    <a16:creationId xmlns:a16="http://schemas.microsoft.com/office/drawing/2014/main" id="{3834438D-7B2C-49FF-9C9A-B29402E906F9}"/>
+                  </a:ext>
+                </a:extLst>
+              </p:cNvPr>
+              <p:cNvSpPr>
+                <a:spLocks noGrp="1"/>
+              </p:cNvSpPr>
+              <p:nvPr>
+                <p:ph idx="1"/>
+              </p:nvPr>
+            </p:nvSpPr>
+            <p:spPr/>
+            <p:txBody>
+              <a:bodyPr/>
+              <a:lstStyle/>
+              <a:p>
+                <a:pPr>
+                  <a:buFont typeface="Arial" panose="020B0604020202020204" pitchFamily="34" charset="0"/>
+                  <a:buChar char="•"/>
+                </a:pPr>
+                <a:r>
+                  <a:rPr lang="en-US" dirty="0"/>
+                  <a:t> Replace the static context vector with one that is dynamically derived from the encoder hidden states at each point during decoding</a:t>
+                </a:r>
+              </a:p>
+              <a:p>
+                <a:pPr>
+                  <a:buFont typeface="Arial" panose="020B0604020202020204" pitchFamily="34" charset="0"/>
+                  <a:buChar char="•"/>
+                </a:pPr>
+                <a:r>
+                  <a:rPr lang="en-US" dirty="0"/>
+                  <a:t> A new context vector is generated at each decoding step and takes all encoder hidden states into derivation</a:t>
+                </a:r>
+              </a:p>
+              <a:p>
+                <a:pPr>
+                  <a:buFont typeface="Arial" panose="020B0604020202020204" pitchFamily="34" charset="0"/>
+                  <a:buChar char="•"/>
+                </a:pPr>
+                <a:r>
+                  <a:rPr lang="en-US" dirty="0"/>
+                  <a:t> This context vector is available to decoder hidden state calculations</a:t>
+                </a:r>
+              </a:p>
+              <a:p>
+                <a:pPr marL="0" indent="0">
+                  <a:buNone/>
+                </a:pPr>
+                <a14:m>
+                  <m:oMathPara xmlns:m="http://schemas.openxmlformats.org/officeDocument/2006/math">
+                    <m:oMathParaPr>
+                      <m:jc m:val="centerGroup"/>
+                    </m:oMathParaPr>
+                    <m:oMath xmlns:m="http://schemas.openxmlformats.org/officeDocument/2006/math">
+                      <m:sSubSup>
+                        <m:sSubSupPr>
+                          <m:ctrlPr>
+                            <a:rPr lang="en-US" b="0" i="1" smtClean="0">
+                              <a:latin typeface="Cambria Math" panose="02040503050406030204" pitchFamily="18" charset="0"/>
+                            </a:rPr>
+                          </m:ctrlPr>
+                        </m:sSubSupPr>
+                        <m:e>
+                          <m:r>
+                            <a:rPr lang="en-US" b="0" i="1" smtClean="0">
+                              <a:latin typeface="Cambria Math" panose="02040503050406030204" pitchFamily="18" charset="0"/>
+                            </a:rPr>
+                            <m:t>h</m:t>
+                          </m:r>
+                        </m:e>
+                        <m:sub>
+                          <m:r>
+                            <a:rPr lang="en-US" b="0" i="1" smtClean="0">
+                              <a:latin typeface="Cambria Math" panose="02040503050406030204" pitchFamily="18" charset="0"/>
+                            </a:rPr>
+                            <m:t>𝑖</m:t>
+                          </m:r>
+                        </m:sub>
+                        <m:sup>
+                          <m:r>
+                            <a:rPr lang="en-US" b="0" i="1" smtClean="0">
+                              <a:latin typeface="Cambria Math" panose="02040503050406030204" pitchFamily="18" charset="0"/>
+                            </a:rPr>
+                            <m:t>𝑑</m:t>
+                          </m:r>
+                        </m:sup>
+                      </m:sSubSup>
+                      <m:r>
+                        <a:rPr lang="en-US" b="0" i="1" smtClean="0">
+                          <a:latin typeface="Cambria Math" panose="02040503050406030204" pitchFamily="18" charset="0"/>
+                        </a:rPr>
+                        <m:t>=</m:t>
+                      </m:r>
+                      <m:r>
+                        <a:rPr lang="en-US" b="0" i="1" smtClean="0">
+                          <a:latin typeface="Cambria Math" panose="02040503050406030204" pitchFamily="18" charset="0"/>
+                        </a:rPr>
+                        <m:t>𝑔</m:t>
+                      </m:r>
+                      <m:d>
+                        <m:dPr>
+                          <m:ctrlPr>
+                            <a:rPr lang="en-US" b="0" i="1" smtClean="0">
+                              <a:latin typeface="Cambria Math" panose="02040503050406030204" pitchFamily="18" charset="0"/>
+                            </a:rPr>
+                          </m:ctrlPr>
+                        </m:dPr>
+                        <m:e>
+                          <m:sSub>
+                            <m:sSubPr>
+                              <m:ctrlPr>
+                                <a:rPr lang="en-US" b="0" i="1" smtClean="0">
+                                  <a:latin typeface="Cambria Math" panose="02040503050406030204" pitchFamily="18" charset="0"/>
+                                </a:rPr>
+                              </m:ctrlPr>
+                            </m:sSubPr>
+                            <m:e>
+                              <m:acc>
+                                <m:accPr>
+                                  <m:chr m:val="̂"/>
+                                  <m:ctrlPr>
+                                    <a:rPr lang="en-US" b="0" i="1" smtClean="0">
+                                      <a:latin typeface="Cambria Math" panose="02040503050406030204" pitchFamily="18" charset="0"/>
+                                    </a:rPr>
+                                  </m:ctrlPr>
+                                </m:accPr>
+                                <m:e>
+                                  <m:r>
+                                    <a:rPr lang="en-US" b="0" i="1" smtClean="0">
+                                      <a:latin typeface="Cambria Math" panose="02040503050406030204" pitchFamily="18" charset="0"/>
+                                    </a:rPr>
+                                    <m:t>𝑦</m:t>
+                                  </m:r>
+                                </m:e>
+                              </m:acc>
+                            </m:e>
+                            <m:sub>
+                              <m:r>
+                                <a:rPr lang="en-US" b="0" i="1" smtClean="0">
+                                  <a:latin typeface="Cambria Math" panose="02040503050406030204" pitchFamily="18" charset="0"/>
+                                </a:rPr>
+                                <m:t>𝑖</m:t>
+                              </m:r>
+                              <m:r>
+                                <a:rPr lang="en-US" b="0" i="1" smtClean="0">
+                                  <a:latin typeface="Cambria Math" panose="02040503050406030204" pitchFamily="18" charset="0"/>
+                                </a:rPr>
+                                <m:t>−1</m:t>
+                              </m:r>
+                            </m:sub>
+                          </m:sSub>
+                          <m:r>
+                            <a:rPr lang="en-US" b="0" i="1" smtClean="0">
+                              <a:latin typeface="Cambria Math" panose="02040503050406030204" pitchFamily="18" charset="0"/>
+                            </a:rPr>
+                            <m:t>,</m:t>
+                          </m:r>
+                          <m:sSubSup>
+                            <m:sSubSupPr>
+                              <m:ctrlPr>
+                                <a:rPr lang="en-US" b="0" i="1" smtClean="0">
+                                  <a:latin typeface="Cambria Math" panose="02040503050406030204" pitchFamily="18" charset="0"/>
+                                </a:rPr>
+                              </m:ctrlPr>
+                            </m:sSubSupPr>
+                            <m:e>
+                              <m:r>
+                                <a:rPr lang="en-US" b="0" i="1" smtClean="0">
+                                  <a:latin typeface="Cambria Math" panose="02040503050406030204" pitchFamily="18" charset="0"/>
+                                </a:rPr>
+                                <m:t>h</m:t>
+                              </m:r>
+                            </m:e>
+                            <m:sub>
+                              <m:r>
+                                <a:rPr lang="en-US" b="0" i="1" smtClean="0">
+                                  <a:latin typeface="Cambria Math" panose="02040503050406030204" pitchFamily="18" charset="0"/>
+                                </a:rPr>
+                                <m:t>𝑖</m:t>
+                              </m:r>
+                              <m:r>
+                                <a:rPr lang="en-US" b="0" i="1" smtClean="0">
+                                  <a:latin typeface="Cambria Math" panose="02040503050406030204" pitchFamily="18" charset="0"/>
+                                </a:rPr>
+                                <m:t>−1</m:t>
+                              </m:r>
+                            </m:sub>
+                            <m:sup>
+                              <m:r>
+                                <a:rPr lang="en-US" b="0" i="1" smtClean="0">
+                                  <a:latin typeface="Cambria Math" panose="02040503050406030204" pitchFamily="18" charset="0"/>
+                                </a:rPr>
+                                <m:t>𝑑</m:t>
+                              </m:r>
+                            </m:sup>
+                          </m:sSubSup>
+                          <m:r>
+                            <a:rPr lang="en-US" b="0" i="1" smtClean="0">
+                              <a:latin typeface="Cambria Math" panose="02040503050406030204" pitchFamily="18" charset="0"/>
+                            </a:rPr>
+                            <m:t>,</m:t>
+                          </m:r>
+                          <m:sSub>
+                            <m:sSubPr>
+                              <m:ctrlPr>
+                                <a:rPr lang="en-US" b="0" i="1" smtClean="0">
+                                  <a:latin typeface="Cambria Math" panose="02040503050406030204" pitchFamily="18" charset="0"/>
+                                </a:rPr>
+                              </m:ctrlPr>
+                            </m:sSubPr>
+                            <m:e>
+                              <m:r>
+                                <a:rPr lang="en-US" b="0" i="1" smtClean="0">
+                                  <a:latin typeface="Cambria Math" panose="02040503050406030204" pitchFamily="18" charset="0"/>
+                                </a:rPr>
+                                <m:t>𝑐</m:t>
+                              </m:r>
+                            </m:e>
+                            <m:sub>
+                              <m:r>
+                                <a:rPr lang="en-US" b="0" i="1" smtClean="0">
+                                  <a:latin typeface="Cambria Math" panose="02040503050406030204" pitchFamily="18" charset="0"/>
+                                </a:rPr>
+                                <m:t>𝑖</m:t>
+                              </m:r>
+                            </m:sub>
+                          </m:sSub>
+                        </m:e>
+                      </m:d>
+                    </m:oMath>
+                  </m:oMathPara>
+                </a14:m>
+                <a:endParaRPr lang="en-US" b="0" dirty="0"/>
+              </a:p>
+            </p:txBody>
+          </p:sp>
+        </mc:Choice>
+        <mc:Fallback xmlns="">
+          <p:sp>
+            <p:nvSpPr>
+              <p:cNvPr id="3" name="Content Placeholder 2">
+                <a:extLst>
+                  <a:ext uri="{FF2B5EF4-FFF2-40B4-BE49-F238E27FC236}">
+                    <a16:creationId xmlns:a16="http://schemas.microsoft.com/office/drawing/2014/main" id="{3834438D-7B2C-49FF-9C9A-B29402E906F9}"/>
+                  </a:ext>
+                </a:extLst>
+              </p:cNvPr>
+              <p:cNvSpPr>
+                <a:spLocks noGrp="1" noRot="1" noChangeAspect="1" noMove="1" noResize="1" noEditPoints="1" noAdjustHandles="1" noChangeArrowheads="1" noChangeShapeType="1" noTextEdit="1"/>
+              </p:cNvSpPr>
+              <p:nvPr>
+                <p:ph idx="1"/>
+              </p:nvPr>
+            </p:nvSpPr>
+            <p:spPr>
+              <a:blipFill>
+                <a:blip r:embed="rId2"/>
+                <a:stretch>
+                  <a:fillRect l="-1939" t="-1667"/>
+                </a:stretch>
+              </a:blipFill>
+            </p:spPr>
+            <p:txBody>
+              <a:bodyPr/>
+              <a:lstStyle/>
+              <a:p>
+                <a:r>
+                  <a:rPr lang="en-US">
+                    <a:noFill/>
+                  </a:rPr>
+                  <a:t> </a:t>
+                </a:r>
+              </a:p>
+            </p:txBody>
+          </p:sp>
+        </mc:Fallback>
+      </mc:AlternateContent>
+    </p:spTree>
+    <p:extLst>
+      <p:ext uri="{BB962C8B-B14F-4D97-AF65-F5344CB8AC3E}">
+        <p14:creationId xmlns:p14="http://schemas.microsoft.com/office/powerpoint/2010/main" val="2030443692"/>
+      </p:ext>
+    </p:extLst>
+  </p:cSld>
+  <p:clrMapOvr>
+    <a:masterClrMapping/>
+  </p:clrMapOvr>
+</p:sld>
+</file>
+
+<file path=ppt/slides/slide11.xml><?xml version="1.0" encoding="utf-8"?>
+<p:sld xmlns:a="http://schemas.openxmlformats.org/drawingml/2006/main" xmlns:r="http://schemas.openxmlformats.org/officeDocument/2006/relationships" xmlns:p="http://schemas.openxmlformats.org/presentationml/2006/main">
+  <p:cSld>
+    <p:spTree>
+      <p:nvGrpSpPr>
+        <p:cNvPr id="1" name=""/>
+        <p:cNvGrpSpPr/>
+        <p:nvPr/>
+      </p:nvGrpSpPr>
+      <p:grpSpPr>
+        <a:xfrm>
+          <a:off x="0" y="0"/>
+          <a:ext cx="0" cy="0"/>
+          <a:chOff x="0" y="0"/>
+          <a:chExt cx="0" cy="0"/>
+        </a:xfrm>
+      </p:grpSpPr>
+      <p:sp>
+        <p:nvSpPr>
+          <p:cNvPr id="2" name="Title 1">
+            <a:extLst>
+              <a:ext uri="{FF2B5EF4-FFF2-40B4-BE49-F238E27FC236}">
+                <a16:creationId xmlns:a16="http://schemas.microsoft.com/office/drawing/2014/main" id="{F0F961C6-6912-4E67-9F0D-D895C1DE1A60}"/>
+              </a:ext>
+            </a:extLst>
+          </p:cNvPr>
+          <p:cNvSpPr>
+            <a:spLocks noGrp="1"/>
+          </p:cNvSpPr>
+          <p:nvPr>
+            <p:ph type="title"/>
+          </p:nvPr>
+        </p:nvSpPr>
+        <p:spPr/>
+        <p:txBody>
+          <a:bodyPr/>
+          <a:lstStyle/>
+          <a:p>
+            <a:r>
+              <a:rPr lang="en-US" dirty="0"/>
+              <a:t>Attention mechanism</a:t>
+            </a:r>
+          </a:p>
+        </p:txBody>
+      </p:sp>
+      <mc:AlternateContent xmlns:mc="http://schemas.openxmlformats.org/markup-compatibility/2006" xmlns:a14="http://schemas.microsoft.com/office/drawing/2010/main">
+        <mc:Choice Requires="a14">
+          <p:sp>
+            <p:nvSpPr>
+              <p:cNvPr id="3" name="Content Placeholder 2">
+                <a:extLst>
+                  <a:ext uri="{FF2B5EF4-FFF2-40B4-BE49-F238E27FC236}">
+                    <a16:creationId xmlns:a16="http://schemas.microsoft.com/office/drawing/2014/main" id="{3AC57B26-E9D9-429E-B06C-03F30AF5750A}"/>
+                  </a:ext>
+                </a:extLst>
+              </p:cNvPr>
+              <p:cNvSpPr>
+                <a:spLocks noGrp="1"/>
+              </p:cNvSpPr>
+              <p:nvPr>
+                <p:ph idx="1"/>
+              </p:nvPr>
+            </p:nvSpPr>
+            <p:spPr/>
+            <p:txBody>
+              <a:bodyPr>
+                <a:normAutofit/>
+              </a:bodyPr>
+              <a:lstStyle/>
+              <a:p>
+                <a:pPr>
+                  <a:buFont typeface="Arial" panose="020B0604020202020204" pitchFamily="34" charset="0"/>
+                  <a:buChar char="•"/>
+                </a:pPr>
+                <a:r>
+                  <a:rPr lang="en-US" dirty="0"/>
+                  <a:t>To calculate </a:t>
+                </a:r>
+                <a14:m>
+                  <m:oMath xmlns:m="http://schemas.openxmlformats.org/officeDocument/2006/math">
+                    <m:sSub>
+                      <m:sSubPr>
+                        <m:ctrlPr>
+                          <a:rPr lang="en-US" i="1">
+                            <a:latin typeface="Cambria Math" panose="02040503050406030204" pitchFamily="18" charset="0"/>
+                          </a:rPr>
+                        </m:ctrlPr>
+                      </m:sSubPr>
+                      <m:e>
+                        <m:r>
+                          <a:rPr lang="en-US" i="1">
+                            <a:latin typeface="Cambria Math" panose="02040503050406030204" pitchFamily="18" charset="0"/>
+                          </a:rPr>
+                          <m:t>𝑐</m:t>
+                        </m:r>
+                      </m:e>
+                      <m:sub>
+                        <m:r>
+                          <a:rPr lang="en-US" i="1">
+                            <a:latin typeface="Cambria Math" panose="02040503050406030204" pitchFamily="18" charset="0"/>
+                          </a:rPr>
+                          <m:t>𝑖</m:t>
+                        </m:r>
+                      </m:sub>
+                    </m:sSub>
+                  </m:oMath>
+                </a14:m>
+                <a:r>
+                  <a:rPr lang="en-US" dirty="0"/>
+                  <a:t>, first find relevance of each encoder hidden state to the decoder state. Call it </a:t>
+                </a:r>
+                <a14:m>
+                  <m:oMath xmlns:m="http://schemas.openxmlformats.org/officeDocument/2006/math">
+                    <m:r>
+                      <a:rPr lang="en-US" i="1">
+                        <a:latin typeface="Cambria Math" panose="02040503050406030204" pitchFamily="18" charset="0"/>
+                      </a:rPr>
+                      <m:t>𝑠𝑐𝑜𝑟𝑒</m:t>
+                    </m:r>
+                    <m:r>
+                      <a:rPr lang="en-US" i="1">
+                        <a:latin typeface="Cambria Math" panose="02040503050406030204" pitchFamily="18" charset="0"/>
+                      </a:rPr>
+                      <m:t>(</m:t>
+                    </m:r>
+                    <m:sSubSup>
+                      <m:sSubSupPr>
+                        <m:ctrlPr>
+                          <a:rPr lang="en-US" i="1">
+                            <a:latin typeface="Cambria Math" panose="02040503050406030204" pitchFamily="18" charset="0"/>
+                          </a:rPr>
+                        </m:ctrlPr>
+                      </m:sSubSupPr>
+                      <m:e>
+                        <m:r>
+                          <a:rPr lang="en-US" i="1">
+                            <a:latin typeface="Cambria Math" panose="02040503050406030204" pitchFamily="18" charset="0"/>
+                          </a:rPr>
+                          <m:t>h</m:t>
+                        </m:r>
+                      </m:e>
+                      <m:sub>
+                        <m:r>
+                          <a:rPr lang="en-US" i="1">
+                            <a:latin typeface="Cambria Math" panose="02040503050406030204" pitchFamily="18" charset="0"/>
+                          </a:rPr>
+                          <m:t>𝑖</m:t>
+                        </m:r>
+                        <m:r>
+                          <a:rPr lang="en-US" i="1">
+                            <a:latin typeface="Cambria Math" panose="02040503050406030204" pitchFamily="18" charset="0"/>
+                          </a:rPr>
+                          <m:t>−1</m:t>
+                        </m:r>
+                      </m:sub>
+                      <m:sup>
+                        <m:r>
+                          <a:rPr lang="en-US" i="1">
+                            <a:latin typeface="Cambria Math" panose="02040503050406030204" pitchFamily="18" charset="0"/>
+                          </a:rPr>
+                          <m:t>𝑑</m:t>
+                        </m:r>
+                      </m:sup>
+                    </m:sSubSup>
+                    <m:r>
+                      <a:rPr lang="en-US" i="1">
+                        <a:latin typeface="Cambria Math" panose="02040503050406030204" pitchFamily="18" charset="0"/>
+                      </a:rPr>
+                      <m:t>,</m:t>
+                    </m:r>
+                    <m:sSubSup>
+                      <m:sSubSupPr>
+                        <m:ctrlPr>
+                          <a:rPr lang="en-US" i="1">
+                            <a:latin typeface="Cambria Math" panose="02040503050406030204" pitchFamily="18" charset="0"/>
+                          </a:rPr>
+                        </m:ctrlPr>
+                      </m:sSubSupPr>
+                      <m:e>
+                        <m:r>
+                          <a:rPr lang="en-US" i="1">
+                            <a:latin typeface="Cambria Math" panose="02040503050406030204" pitchFamily="18" charset="0"/>
+                          </a:rPr>
+                          <m:t>h</m:t>
+                        </m:r>
+                      </m:e>
+                      <m:sub>
+                        <m:r>
+                          <a:rPr lang="en-US" i="1">
+                            <a:latin typeface="Cambria Math" panose="02040503050406030204" pitchFamily="18" charset="0"/>
+                          </a:rPr>
+                          <m:t>𝑗</m:t>
+                        </m:r>
+                      </m:sub>
+                      <m:sup>
+                        <m:r>
+                          <a:rPr lang="en-US" i="1">
+                            <a:latin typeface="Cambria Math" panose="02040503050406030204" pitchFamily="18" charset="0"/>
+                          </a:rPr>
+                          <m:t>𝑒</m:t>
+                        </m:r>
+                      </m:sup>
+                    </m:sSubSup>
+                    <m:r>
+                      <a:rPr lang="en-US" i="1">
+                        <a:latin typeface="Cambria Math" panose="02040503050406030204" pitchFamily="18" charset="0"/>
+                      </a:rPr>
+                      <m:t>)</m:t>
+                    </m:r>
+                  </m:oMath>
+                </a14:m>
+                <a:r>
+                  <a:rPr lang="en-US" dirty="0"/>
+                  <a:t> for each encoder state </a:t>
+                </a:r>
+                <a14:m>
+                  <m:oMath xmlns:m="http://schemas.openxmlformats.org/officeDocument/2006/math">
+                    <m:r>
+                      <a:rPr lang="en-US" i="1" dirty="0">
+                        <a:latin typeface="Cambria Math" panose="02040503050406030204" pitchFamily="18" charset="0"/>
+                      </a:rPr>
+                      <m:t>𝑗</m:t>
+                    </m:r>
+                  </m:oMath>
+                </a14:m>
+                <a:endParaRPr lang="en-US" dirty="0"/>
+              </a:p>
+              <a:p>
+                <a:pPr lvl="1">
+                  <a:buFont typeface="Arial" panose="020B0604020202020204" pitchFamily="34" charset="0"/>
+                  <a:buChar char="•"/>
+                </a:pPr>
+                <a:r>
+                  <a:rPr lang="en-US" dirty="0"/>
+                  <a:t>The </a:t>
+                </a:r>
+                <a14:m>
+                  <m:oMath xmlns:m="http://schemas.openxmlformats.org/officeDocument/2006/math">
+                    <m:r>
+                      <a:rPr lang="en-US" i="1">
+                        <a:latin typeface="Cambria Math" panose="02040503050406030204" pitchFamily="18" charset="0"/>
+                      </a:rPr>
+                      <m:t>𝑠𝑐𝑜𝑟𝑒</m:t>
+                    </m:r>
+                  </m:oMath>
+                </a14:m>
+                <a:r>
+                  <a:rPr lang="en-US" dirty="0"/>
+                  <a:t> can simply be dot product, or be parameterized with weights</a:t>
+                </a:r>
+              </a:p>
+              <a:p>
+                <a:pPr>
+                  <a:buFont typeface="Arial" panose="020B0604020202020204" pitchFamily="34" charset="0"/>
+                  <a:buChar char="•"/>
+                </a:pPr>
+                <a:r>
+                  <a:rPr lang="en-US" dirty="0"/>
+                  <a:t> Normalize them with a </a:t>
+                </a:r>
+                <a:r>
+                  <a:rPr lang="en-US" dirty="0" err="1"/>
+                  <a:t>softmax</a:t>
+                </a:r>
+                <a:r>
+                  <a:rPr lang="en-US" dirty="0"/>
+                  <a:t> to create a vector of weights </a:t>
+                </a:r>
+                <a14:m>
+                  <m:oMath xmlns:m="http://schemas.openxmlformats.org/officeDocument/2006/math">
+                    <m:sSub>
+                      <m:sSubPr>
+                        <m:ctrlPr>
+                          <a:rPr lang="en-US" b="0" i="1" smtClean="0">
+                            <a:latin typeface="Cambria Math" panose="02040503050406030204" pitchFamily="18" charset="0"/>
+                          </a:rPr>
+                        </m:ctrlPr>
+                      </m:sSubPr>
+                      <m:e>
+                        <m:r>
+                          <a:rPr lang="en-US" b="0" i="1" smtClean="0">
+                            <a:latin typeface="Cambria Math" panose="02040503050406030204" pitchFamily="18" charset="0"/>
+                          </a:rPr>
+                          <m:t>𝛼</m:t>
+                        </m:r>
+                      </m:e>
+                      <m:sub>
+                        <m:r>
+                          <a:rPr lang="en-US" b="0" i="1" smtClean="0">
+                            <a:latin typeface="Cambria Math" panose="02040503050406030204" pitchFamily="18" charset="0"/>
+                          </a:rPr>
+                          <m:t>𝑖</m:t>
+                        </m:r>
+                        <m:r>
+                          <a:rPr lang="en-US" b="0" i="1" smtClean="0">
+                            <a:latin typeface="Cambria Math" panose="02040503050406030204" pitchFamily="18" charset="0"/>
+                          </a:rPr>
+                          <m:t>,</m:t>
+                        </m:r>
+                        <m:r>
+                          <a:rPr lang="en-US" b="0" i="1" smtClean="0">
+                            <a:latin typeface="Cambria Math" panose="02040503050406030204" pitchFamily="18" charset="0"/>
+                          </a:rPr>
+                          <m:t>𝑗</m:t>
+                        </m:r>
+                      </m:sub>
+                    </m:sSub>
+                  </m:oMath>
+                </a14:m>
+                <a:r>
+                  <a:rPr lang="en-US" dirty="0"/>
+                  <a:t> that tells us the proportional relevance of each encoder hidden state </a:t>
+                </a:r>
+                <a14:m>
+                  <m:oMath xmlns:m="http://schemas.openxmlformats.org/officeDocument/2006/math">
+                    <m:r>
+                      <a:rPr lang="en-US" i="1" dirty="0" smtClean="0">
+                        <a:latin typeface="Cambria Math" panose="02040503050406030204" pitchFamily="18" charset="0"/>
+                      </a:rPr>
+                      <m:t>𝑗</m:t>
+                    </m:r>
+                  </m:oMath>
+                </a14:m>
+                <a:r>
+                  <a:rPr lang="en-US" dirty="0"/>
+                  <a:t> to the current decoder state </a:t>
+                </a:r>
+                <a14:m>
+                  <m:oMath xmlns:m="http://schemas.openxmlformats.org/officeDocument/2006/math">
+                    <m:r>
+                      <a:rPr lang="en-US" i="1" dirty="0" smtClean="0">
+                        <a:latin typeface="Cambria Math" panose="02040503050406030204" pitchFamily="18" charset="0"/>
+                      </a:rPr>
+                      <m:t>𝑖</m:t>
+                    </m:r>
+                  </m:oMath>
+                </a14:m>
+                <a:endParaRPr lang="en-US" dirty="0"/>
+              </a:p>
+              <a:p>
+                <a:pPr marL="0" indent="0">
+                  <a:buNone/>
+                </a:pPr>
+                <a14:m>
+                  <m:oMathPara xmlns:m="http://schemas.openxmlformats.org/officeDocument/2006/math">
+                    <m:oMathParaPr>
+                      <m:jc m:val="centerGroup"/>
+                    </m:oMathParaPr>
+                    <m:oMath xmlns:m="http://schemas.openxmlformats.org/officeDocument/2006/math">
+                      <m:sSub>
+                        <m:sSubPr>
+                          <m:ctrlPr>
+                            <a:rPr lang="en-US" i="1">
+                              <a:latin typeface="Cambria Math" panose="02040503050406030204" pitchFamily="18" charset="0"/>
+                            </a:rPr>
+                          </m:ctrlPr>
+                        </m:sSubPr>
+                        <m:e>
+                          <m:r>
+                            <a:rPr lang="en-US" i="1">
+                              <a:latin typeface="Cambria Math" panose="02040503050406030204" pitchFamily="18" charset="0"/>
+                            </a:rPr>
+                            <m:t>𝛼</m:t>
+                          </m:r>
+                        </m:e>
+                        <m:sub>
+                          <m:r>
+                            <a:rPr lang="en-US" i="1">
+                              <a:latin typeface="Cambria Math" panose="02040503050406030204" pitchFamily="18" charset="0"/>
+                            </a:rPr>
+                            <m:t>𝑖</m:t>
+                          </m:r>
+                          <m:r>
+                            <a:rPr lang="en-US" i="1">
+                              <a:latin typeface="Cambria Math" panose="02040503050406030204" pitchFamily="18" charset="0"/>
+                            </a:rPr>
+                            <m:t>,</m:t>
+                          </m:r>
+                          <m:r>
+                            <a:rPr lang="en-US" i="1">
+                              <a:latin typeface="Cambria Math" panose="02040503050406030204" pitchFamily="18" charset="0"/>
+                            </a:rPr>
+                            <m:t>𝑗</m:t>
+                          </m:r>
+                        </m:sub>
+                      </m:sSub>
+                      <m:r>
+                        <a:rPr lang="en-US" b="0" i="1" smtClean="0">
+                          <a:latin typeface="Cambria Math" panose="02040503050406030204" pitchFamily="18" charset="0"/>
+                        </a:rPr>
+                        <m:t>=</m:t>
+                      </m:r>
+                      <m:r>
+                        <a:rPr lang="en-US" b="0" i="1" smtClean="0">
+                          <a:latin typeface="Cambria Math" panose="02040503050406030204" pitchFamily="18" charset="0"/>
+                        </a:rPr>
+                        <m:t>𝑠𝑜𝑓𝑡𝑚𝑎𝑥</m:t>
+                      </m:r>
+                      <m:r>
+                        <a:rPr lang="en-US" b="0" i="1" smtClean="0">
+                          <a:latin typeface="Cambria Math" panose="02040503050406030204" pitchFamily="18" charset="0"/>
+                        </a:rPr>
+                        <m:t>(</m:t>
+                      </m:r>
+                      <m:r>
+                        <a:rPr lang="en-US" i="1">
+                          <a:latin typeface="Cambria Math" panose="02040503050406030204" pitchFamily="18" charset="0"/>
+                        </a:rPr>
+                        <m:t>𝑠𝑐𝑜𝑟𝑒</m:t>
+                      </m:r>
+                      <m:d>
+                        <m:dPr>
+                          <m:ctrlPr>
+                            <a:rPr lang="en-US" i="1">
+                              <a:latin typeface="Cambria Math" panose="02040503050406030204" pitchFamily="18" charset="0"/>
+                            </a:rPr>
+                          </m:ctrlPr>
+                        </m:dPr>
+                        <m:e>
+                          <m:sSubSup>
+                            <m:sSubSupPr>
+                              <m:ctrlPr>
+                                <a:rPr lang="en-US" i="1">
+                                  <a:latin typeface="Cambria Math" panose="02040503050406030204" pitchFamily="18" charset="0"/>
+                                </a:rPr>
+                              </m:ctrlPr>
+                            </m:sSubSupPr>
+                            <m:e>
+                              <m:r>
+                                <a:rPr lang="en-US" i="1">
+                                  <a:latin typeface="Cambria Math" panose="02040503050406030204" pitchFamily="18" charset="0"/>
+                                </a:rPr>
+                                <m:t>h</m:t>
+                              </m:r>
+                            </m:e>
+                            <m:sub>
+                              <m:r>
+                                <a:rPr lang="en-US" i="1">
+                                  <a:latin typeface="Cambria Math" panose="02040503050406030204" pitchFamily="18" charset="0"/>
+                                </a:rPr>
+                                <m:t>𝑖</m:t>
+                              </m:r>
+                              <m:r>
+                                <a:rPr lang="en-US" i="1">
+                                  <a:latin typeface="Cambria Math" panose="02040503050406030204" pitchFamily="18" charset="0"/>
+                                </a:rPr>
+                                <m:t>−1</m:t>
+                              </m:r>
+                            </m:sub>
+                            <m:sup>
+                              <m:r>
+                                <a:rPr lang="en-US" i="1">
+                                  <a:latin typeface="Cambria Math" panose="02040503050406030204" pitchFamily="18" charset="0"/>
+                                </a:rPr>
+                                <m:t>𝑑</m:t>
+                              </m:r>
+                            </m:sup>
+                          </m:sSubSup>
+                          <m:r>
+                            <a:rPr lang="en-US" i="1">
+                              <a:latin typeface="Cambria Math" panose="02040503050406030204" pitchFamily="18" charset="0"/>
+                            </a:rPr>
+                            <m:t>,</m:t>
+                          </m:r>
+                          <m:sSubSup>
+                            <m:sSubSupPr>
+                              <m:ctrlPr>
+                                <a:rPr lang="en-US" i="1">
+                                  <a:latin typeface="Cambria Math" panose="02040503050406030204" pitchFamily="18" charset="0"/>
+                                </a:rPr>
+                              </m:ctrlPr>
+                            </m:sSubSupPr>
+                            <m:e>
+                              <m:r>
+                                <a:rPr lang="en-US" i="1">
+                                  <a:latin typeface="Cambria Math" panose="02040503050406030204" pitchFamily="18" charset="0"/>
+                                </a:rPr>
+                                <m:t>h</m:t>
+                              </m:r>
+                            </m:e>
+                            <m:sub>
+                              <m:r>
+                                <a:rPr lang="en-US" i="1">
+                                  <a:latin typeface="Cambria Math" panose="02040503050406030204" pitchFamily="18" charset="0"/>
+                                </a:rPr>
+                                <m:t>𝑗</m:t>
+                              </m:r>
+                            </m:sub>
+                            <m:sup>
+                              <m:r>
+                                <a:rPr lang="en-US" i="1">
+                                  <a:latin typeface="Cambria Math" panose="02040503050406030204" pitchFamily="18" charset="0"/>
+                                </a:rPr>
+                                <m:t>𝑒</m:t>
+                              </m:r>
+                            </m:sup>
+                          </m:sSubSup>
+                        </m:e>
+                      </m:d>
+                      <m:r>
+                        <a:rPr lang="en-US" b="0" i="1" smtClean="0">
+                          <a:latin typeface="Cambria Math" panose="02040503050406030204" pitchFamily="18" charset="0"/>
+                        </a:rPr>
+                        <m:t>∀</m:t>
+                      </m:r>
+                      <m:r>
+                        <a:rPr lang="en-US" b="0" i="1" smtClean="0">
+                          <a:latin typeface="Cambria Math" panose="02040503050406030204" pitchFamily="18" charset="0"/>
+                        </a:rPr>
+                        <m:t>𝑗</m:t>
+                      </m:r>
+                      <m:r>
+                        <a:rPr lang="en-US" b="0" i="1" smtClean="0">
+                          <a:latin typeface="Cambria Math" panose="02040503050406030204" pitchFamily="18" charset="0"/>
+                        </a:rPr>
+                        <m:t>∈</m:t>
+                      </m:r>
+                      <m:r>
+                        <a:rPr lang="en-US" b="0" i="1" smtClean="0">
+                          <a:latin typeface="Cambria Math" panose="02040503050406030204" pitchFamily="18" charset="0"/>
+                        </a:rPr>
+                        <m:t>𝑒</m:t>
+                      </m:r>
+                      <m:r>
+                        <a:rPr lang="en-US" b="0" i="1" smtClean="0">
+                          <a:latin typeface="Cambria Math" panose="02040503050406030204" pitchFamily="18" charset="0"/>
+                        </a:rPr>
+                        <m:t>)</m:t>
+                      </m:r>
+                    </m:oMath>
+                  </m:oMathPara>
+                </a14:m>
+                <a:endParaRPr lang="en-US" dirty="0"/>
+              </a:p>
+              <a:p>
+                <a:pPr>
+                  <a:buFont typeface="Arial" panose="020B0604020202020204" pitchFamily="34" charset="0"/>
+                  <a:buChar char="•"/>
+                </a:pPr>
+                <a:r>
+                  <a:rPr lang="en-US" dirty="0"/>
+                  <a:t> Finally, context vector is the weighted average of encoder hidden states</a:t>
+                </a:r>
+              </a:p>
+              <a:p>
+                <a:pPr marL="0" indent="0">
+                  <a:buNone/>
+                </a:pPr>
+                <a14:m>
+                  <m:oMathPara xmlns:m="http://schemas.openxmlformats.org/officeDocument/2006/math">
+                    <m:oMathParaPr>
+                      <m:jc m:val="centerGroup"/>
+                    </m:oMathParaPr>
+                    <m:oMath xmlns:m="http://schemas.openxmlformats.org/officeDocument/2006/math">
+                      <m:sSub>
+                        <m:sSubPr>
+                          <m:ctrlPr>
+                            <a:rPr lang="en-US" b="0" i="1" smtClean="0">
+                              <a:latin typeface="Cambria Math" panose="02040503050406030204" pitchFamily="18" charset="0"/>
+                            </a:rPr>
+                          </m:ctrlPr>
+                        </m:sSubPr>
+                        <m:e>
+                          <m:r>
+                            <a:rPr lang="en-US" b="0" i="1" smtClean="0">
+                              <a:latin typeface="Cambria Math" panose="02040503050406030204" pitchFamily="18" charset="0"/>
+                            </a:rPr>
+                            <m:t>𝑐</m:t>
+                          </m:r>
+                        </m:e>
+                        <m:sub>
+                          <m:r>
+                            <a:rPr lang="en-US" b="0" i="1" smtClean="0">
+                              <a:latin typeface="Cambria Math" panose="02040503050406030204" pitchFamily="18" charset="0"/>
+                            </a:rPr>
+                            <m:t>𝑖</m:t>
+                          </m:r>
+                        </m:sub>
+                      </m:sSub>
+                      <m:r>
+                        <a:rPr lang="en-US" b="0" i="1" smtClean="0">
+                          <a:latin typeface="Cambria Math" panose="02040503050406030204" pitchFamily="18" charset="0"/>
+                        </a:rPr>
+                        <m:t>=</m:t>
+                      </m:r>
+                      <m:nary>
+                        <m:naryPr>
+                          <m:chr m:val="∑"/>
+                          <m:supHide m:val="on"/>
+                          <m:ctrlPr>
+                            <a:rPr lang="en-US" b="0" i="1" smtClean="0">
+                              <a:latin typeface="Cambria Math" panose="02040503050406030204" pitchFamily="18" charset="0"/>
+                            </a:rPr>
+                          </m:ctrlPr>
+                        </m:naryPr>
+                        <m:sub>
+                          <m:r>
+                            <m:rPr>
+                              <m:brk m:alnAt="7"/>
+                            </m:rPr>
+                            <a:rPr lang="en-US" b="0" i="1" smtClean="0">
+                              <a:latin typeface="Cambria Math" panose="02040503050406030204" pitchFamily="18" charset="0"/>
+                            </a:rPr>
+                            <m:t>𝑗</m:t>
+                          </m:r>
+                        </m:sub>
+                        <m:sup/>
+                        <m:e>
+                          <m:sSub>
+                            <m:sSubPr>
+                              <m:ctrlPr>
+                                <a:rPr lang="en-US" i="1">
+                                  <a:latin typeface="Cambria Math" panose="02040503050406030204" pitchFamily="18" charset="0"/>
+                                </a:rPr>
+                              </m:ctrlPr>
+                            </m:sSubPr>
+                            <m:e>
+                              <m:r>
+                                <a:rPr lang="en-US" i="1">
+                                  <a:latin typeface="Cambria Math" panose="02040503050406030204" pitchFamily="18" charset="0"/>
+                                </a:rPr>
+                                <m:t>𝛼</m:t>
+                              </m:r>
+                            </m:e>
+                            <m:sub>
+                              <m:r>
+                                <a:rPr lang="en-US" i="1">
+                                  <a:latin typeface="Cambria Math" panose="02040503050406030204" pitchFamily="18" charset="0"/>
+                                </a:rPr>
+                                <m:t>𝑖</m:t>
+                              </m:r>
+                              <m:r>
+                                <a:rPr lang="en-US" i="1">
+                                  <a:latin typeface="Cambria Math" panose="02040503050406030204" pitchFamily="18" charset="0"/>
+                                </a:rPr>
+                                <m:t>,</m:t>
+                              </m:r>
+                              <m:r>
+                                <a:rPr lang="en-US" i="1">
+                                  <a:latin typeface="Cambria Math" panose="02040503050406030204" pitchFamily="18" charset="0"/>
+                                </a:rPr>
+                                <m:t>𝑗</m:t>
+                              </m:r>
+                            </m:sub>
+                          </m:sSub>
+                        </m:e>
+                      </m:nary>
+                      <m:sSubSup>
+                        <m:sSubSupPr>
+                          <m:ctrlPr>
+                            <a:rPr lang="en-US" b="0" i="1" smtClean="0">
+                              <a:latin typeface="Cambria Math" panose="02040503050406030204" pitchFamily="18" charset="0"/>
+                            </a:rPr>
+                          </m:ctrlPr>
+                        </m:sSubSupPr>
+                        <m:e>
+                          <m:r>
+                            <a:rPr lang="en-US" b="0" i="1" smtClean="0">
+                              <a:latin typeface="Cambria Math" panose="02040503050406030204" pitchFamily="18" charset="0"/>
+                            </a:rPr>
+                            <m:t>h</m:t>
+                          </m:r>
+                        </m:e>
+                        <m:sub>
+                          <m:r>
+                            <a:rPr lang="en-US" b="0" i="1" smtClean="0">
+                              <a:latin typeface="Cambria Math" panose="02040503050406030204" pitchFamily="18" charset="0"/>
+                            </a:rPr>
+                            <m:t>𝑗</m:t>
+                          </m:r>
+                        </m:sub>
+                        <m:sup>
+                          <m:r>
+                            <a:rPr lang="en-US" b="0" i="1" smtClean="0">
+                              <a:latin typeface="Cambria Math" panose="02040503050406030204" pitchFamily="18" charset="0"/>
+                            </a:rPr>
+                            <m:t>𝑒</m:t>
+                          </m:r>
+                        </m:sup>
+                      </m:sSubSup>
+                    </m:oMath>
+                  </m:oMathPara>
+                </a14:m>
+                <a:endParaRPr lang="en-US" dirty="0"/>
+              </a:p>
+            </p:txBody>
+          </p:sp>
+        </mc:Choice>
+        <mc:Fallback xmlns="">
+          <p:sp>
+            <p:nvSpPr>
+              <p:cNvPr id="3" name="Content Placeholder 2">
+                <a:extLst>
+                  <a:ext uri="{FF2B5EF4-FFF2-40B4-BE49-F238E27FC236}">
+                    <a16:creationId xmlns:a16="http://schemas.microsoft.com/office/drawing/2014/main" id="{3AC57B26-E9D9-429E-B06C-03F30AF5750A}"/>
+                  </a:ext>
+                </a:extLst>
+              </p:cNvPr>
+              <p:cNvSpPr>
+                <a:spLocks noGrp="1" noRot="1" noChangeAspect="1" noMove="1" noResize="1" noEditPoints="1" noAdjustHandles="1" noChangeArrowheads="1" noChangeShapeType="1" noTextEdit="1"/>
+              </p:cNvSpPr>
+              <p:nvPr>
+                <p:ph idx="1"/>
+              </p:nvPr>
+            </p:nvSpPr>
+            <p:spPr>
+              <a:blipFill>
+                <a:blip r:embed="rId2"/>
+                <a:stretch>
+                  <a:fillRect l="-1939" t="-1667" r="-2423"/>
+                </a:stretch>
+              </a:blipFill>
+            </p:spPr>
+            <p:txBody>
+              <a:bodyPr/>
+              <a:lstStyle/>
+              <a:p>
+                <a:r>
+                  <a:rPr lang="en-US">
+                    <a:noFill/>
+                  </a:rPr>
+                  <a:t> </a:t>
+                </a:r>
+              </a:p>
+            </p:txBody>
+          </p:sp>
+        </mc:Fallback>
+      </mc:AlternateContent>
+    </p:spTree>
+    <p:extLst>
+      <p:ext uri="{BB962C8B-B14F-4D97-AF65-F5344CB8AC3E}">
+        <p14:creationId xmlns:p14="http://schemas.microsoft.com/office/powerpoint/2010/main" val="586578242"/>
+      </p:ext>
+    </p:extLst>
+  </p:cSld>
+  <p:clrMapOvr>
+    <a:masterClrMapping/>
+  </p:clrMapOvr>
+</p:sld>
+</file>
+
+<file path=ppt/slides/slide12.xml><?xml version="1.0" encoding="utf-8"?>
+<p:sld xmlns:a="http://schemas.openxmlformats.org/drawingml/2006/main" xmlns:r="http://schemas.openxmlformats.org/officeDocument/2006/relationships" xmlns:p="http://schemas.openxmlformats.org/presentationml/2006/main">
+  <p:cSld>
+    <p:spTree>
+      <p:nvGrpSpPr>
+        <p:cNvPr id="1" name=""/>
+        <p:cNvGrpSpPr/>
+        <p:nvPr/>
+      </p:nvGrpSpPr>
+      <p:grpSpPr>
+        <a:xfrm>
+          <a:off x="0" y="0"/>
+          <a:ext cx="0" cy="0"/>
+          <a:chOff x="0" y="0"/>
+          <a:chExt cx="0" cy="0"/>
+        </a:xfrm>
+      </p:grpSpPr>
+      <p:pic>
+        <p:nvPicPr>
+          <p:cNvPr id="4" name="Content Placeholder 3">
+            <a:extLst>
+              <a:ext uri="{FF2B5EF4-FFF2-40B4-BE49-F238E27FC236}">
+                <a16:creationId xmlns:a16="http://schemas.microsoft.com/office/drawing/2014/main" id="{0478683D-629B-47DD-A68E-FB8582E09656}"/>
+              </a:ext>
+            </a:extLst>
+          </p:cNvPr>
+          <p:cNvPicPr>
+            <a:picLocks noGrp="1" noChangeAspect="1"/>
+          </p:cNvPicPr>
+          <p:nvPr>
+            <p:ph idx="1"/>
+          </p:nvPr>
+        </p:nvPicPr>
+        <p:blipFill>
+          <a:blip r:embed="rId2"/>
+          <a:stretch>
+            <a:fillRect/>
+          </a:stretch>
+        </p:blipFill>
+        <p:spPr>
+          <a:xfrm>
+            <a:off x="1000125" y="838200"/>
+            <a:ext cx="7353300" cy="5872715"/>
+          </a:xfrm>
+          <a:prstGeom prst="rect">
+            <a:avLst/>
+          </a:prstGeom>
+        </p:spPr>
+      </p:pic>
+      <p:sp>
+        <p:nvSpPr>
+          <p:cNvPr id="2" name="Title 1">
+            <a:extLst>
+              <a:ext uri="{FF2B5EF4-FFF2-40B4-BE49-F238E27FC236}">
+                <a16:creationId xmlns:a16="http://schemas.microsoft.com/office/drawing/2014/main" id="{A0A479C6-E37F-44E1-9932-3841B9E289A5}"/>
+              </a:ext>
+            </a:extLst>
+          </p:cNvPr>
+          <p:cNvSpPr>
+            <a:spLocks noGrp="1"/>
+          </p:cNvSpPr>
+          <p:nvPr>
+            <p:ph type="title"/>
+          </p:nvPr>
+        </p:nvSpPr>
+        <p:spPr>
+          <a:xfrm>
+            <a:off x="800100" y="304800"/>
+            <a:ext cx="7543800" cy="807086"/>
+          </a:xfrm>
+        </p:spPr>
+        <p:txBody>
+          <a:bodyPr/>
+          <a:lstStyle/>
+          <a:p>
+            <a:r>
+              <a:rPr lang="en-US" dirty="0"/>
+              <a:t>Attention mechanism</a:t>
+            </a:r>
+          </a:p>
+        </p:txBody>
+      </p:sp>
+    </p:spTree>
+    <p:extLst>
+      <p:ext uri="{BB962C8B-B14F-4D97-AF65-F5344CB8AC3E}">
+        <p14:creationId xmlns:p14="http://schemas.microsoft.com/office/powerpoint/2010/main" val="1645110662"/>
+      </p:ext>
+    </p:extLst>
+  </p:cSld>
+  <p:clrMapOvr>
+    <a:masterClrMapping/>
+  </p:clrMapOvr>
+</p:sld>
+</file>
+
+<file path=ppt/slides/slide13.xml><?xml version="1.0" encoding="utf-8"?>
+<p:sld xmlns:a="http://schemas.openxmlformats.org/drawingml/2006/main" xmlns:r="http://schemas.openxmlformats.org/officeDocument/2006/relationships" xmlns:p="http://schemas.openxmlformats.org/presentationml/2006/main">
+  <p:cSld>
+    <p:spTree>
+      <p:nvGrpSpPr>
+        <p:cNvPr id="1" name=""/>
+        <p:cNvGrpSpPr/>
+        <p:nvPr/>
+      </p:nvGrpSpPr>
+      <p:grpSpPr>
+        <a:xfrm>
+          <a:off x="0" y="0"/>
+          <a:ext cx="0" cy="0"/>
+          <a:chOff x="0" y="0"/>
+          <a:chExt cx="0" cy="0"/>
+        </a:xfrm>
+      </p:grpSpPr>
+      <p:sp>
+        <p:nvSpPr>
+          <p:cNvPr id="2" name="Title 1">
+            <a:extLst>
+              <a:ext uri="{FF2B5EF4-FFF2-40B4-BE49-F238E27FC236}">
+                <a16:creationId xmlns:a16="http://schemas.microsoft.com/office/drawing/2014/main" id="{F45F3424-A412-41A7-BB95-9AB67B1B5669}"/>
+              </a:ext>
+            </a:extLst>
+          </p:cNvPr>
+          <p:cNvSpPr>
+            <a:spLocks noGrp="1"/>
+          </p:cNvSpPr>
+          <p:nvPr>
+            <p:ph type="title"/>
+          </p:nvPr>
+        </p:nvSpPr>
+        <p:spPr/>
+        <p:txBody>
+          <a:bodyPr/>
+          <a:lstStyle/>
+          <a:p>
+            <a:r>
+              <a:rPr lang="en-US" dirty="0"/>
+              <a:t>Applications of Encoder-Decoder Networks</a:t>
+            </a:r>
+          </a:p>
+        </p:txBody>
+      </p:sp>
+      <p:sp>
+        <p:nvSpPr>
+          <p:cNvPr id="3" name="Content Placeholder 2">
+            <a:extLst>
+              <a:ext uri="{FF2B5EF4-FFF2-40B4-BE49-F238E27FC236}">
+                <a16:creationId xmlns:a16="http://schemas.microsoft.com/office/drawing/2014/main" id="{572E6AEF-8FB2-4AA7-96F6-555017C745C2}"/>
+              </a:ext>
+            </a:extLst>
+          </p:cNvPr>
+          <p:cNvSpPr>
+            <a:spLocks noGrp="1"/>
+          </p:cNvSpPr>
+          <p:nvPr>
+            <p:ph idx="1"/>
+          </p:nvPr>
+        </p:nvSpPr>
+        <p:spPr/>
+        <p:txBody>
+          <a:bodyPr>
+            <a:normAutofit/>
+          </a:bodyPr>
+          <a:lstStyle/>
+          <a:p>
+            <a:pPr>
+              <a:buFont typeface="Arial" panose="020B0604020202020204" pitchFamily="34" charset="0"/>
+              <a:buChar char="•"/>
+            </a:pPr>
+            <a:r>
+              <a:rPr lang="en-US" sz="2800" dirty="0"/>
+              <a:t> Text summarization</a:t>
+            </a:r>
+          </a:p>
+          <a:p>
+            <a:pPr>
+              <a:buFont typeface="Arial" panose="020B0604020202020204" pitchFamily="34" charset="0"/>
+              <a:buChar char="•"/>
+            </a:pPr>
+            <a:r>
+              <a:rPr lang="en-US" sz="2800" dirty="0"/>
+              <a:t> Text simplification</a:t>
+            </a:r>
+          </a:p>
+          <a:p>
+            <a:pPr>
+              <a:buFont typeface="Arial" panose="020B0604020202020204" pitchFamily="34" charset="0"/>
+              <a:buChar char="•"/>
+            </a:pPr>
+            <a:r>
+              <a:rPr lang="en-US" sz="2800" dirty="0"/>
+              <a:t> Question answering</a:t>
+            </a:r>
+          </a:p>
+          <a:p>
+            <a:pPr>
+              <a:buFont typeface="Arial" panose="020B0604020202020204" pitchFamily="34" charset="0"/>
+              <a:buChar char="•"/>
+            </a:pPr>
+            <a:r>
+              <a:rPr lang="en-US" sz="2800" dirty="0"/>
+              <a:t> Image captioning</a:t>
+            </a:r>
+          </a:p>
+          <a:p>
+            <a:pPr>
+              <a:buFont typeface="Arial" panose="020B0604020202020204" pitchFamily="34" charset="0"/>
+              <a:buChar char="•"/>
+            </a:pPr>
+            <a:r>
+              <a:rPr lang="en-US" sz="2800" dirty="0"/>
+              <a:t> And more. What do those tasks have in common?</a:t>
+            </a:r>
+          </a:p>
+        </p:txBody>
+      </p:sp>
+    </p:spTree>
+    <p:extLst>
+      <p:ext uri="{BB962C8B-B14F-4D97-AF65-F5344CB8AC3E}">
+        <p14:creationId xmlns:p14="http://schemas.microsoft.com/office/powerpoint/2010/main" val="3278591996"/>
+      </p:ext>
+    </p:extLst>
+  </p:cSld>
+  <p:clrMapOvr>
+    <a:masterClrMapping/>
+  </p:clrMapOvr>
+</p:sld>
+</file>
+
+<file path=ppt/slides/slide2.xml><?xml version="1.0" encoding="utf-8"?>
+<p:sld xmlns:a="http://schemas.openxmlformats.org/drawingml/2006/main" xmlns:r="http://schemas.openxmlformats.org/officeDocument/2006/relationships" xmlns:p="http://schemas.openxmlformats.org/presentationml/2006/main">
+  <p:cSld>
+    <p:spTree>
+      <p:nvGrpSpPr>
+        <p:cNvPr id="1" name=""/>
+        <p:cNvGrpSpPr/>
+        <p:nvPr/>
+      </p:nvGrpSpPr>
+      <p:grpSpPr>
+        <a:xfrm>
+          <a:off x="0" y="0"/>
+          <a:ext cx="0" cy="0"/>
+          <a:chOff x="0" y="0"/>
+          <a:chExt cx="0" cy="0"/>
+        </a:xfrm>
+      </p:grpSpPr>
+      <p:sp>
+        <p:nvSpPr>
+          <p:cNvPr id="2" name="Title 1">
+            <a:extLst>
+              <a:ext uri="{FF2B5EF4-FFF2-40B4-BE49-F238E27FC236}">
+                <a16:creationId xmlns:a16="http://schemas.microsoft.com/office/drawing/2014/main" id="{0DC26A5E-4F91-424F-9F51-9EE7FA29690B}"/>
+              </a:ext>
+            </a:extLst>
+          </p:cNvPr>
+          <p:cNvSpPr>
+            <a:spLocks noGrp="1"/>
+          </p:cNvSpPr>
+          <p:nvPr>
+            <p:ph type="title"/>
+          </p:nvPr>
+        </p:nvSpPr>
+        <p:spPr/>
+        <p:txBody>
+          <a:bodyPr/>
+          <a:lstStyle/>
+          <a:p>
+            <a:r>
+              <a:rPr lang="en-US" dirty="0"/>
+              <a:t>Recall: autoregressive generation</a:t>
+            </a:r>
+          </a:p>
+        </p:txBody>
+      </p:sp>
+      <mc:AlternateContent xmlns:mc="http://schemas.openxmlformats.org/markup-compatibility/2006" xmlns:a14="http://schemas.microsoft.com/office/drawing/2010/main">
+        <mc:Choice Requires="a14">
+          <p:sp>
+            <p:nvSpPr>
+              <p:cNvPr id="3" name="Content Placeholder 2">
+                <a:extLst>
+                  <a:ext uri="{FF2B5EF4-FFF2-40B4-BE49-F238E27FC236}">
+                    <a16:creationId xmlns:a16="http://schemas.microsoft.com/office/drawing/2014/main" id="{28A97F07-5183-48E2-ABAE-7EE6C9949FBE}"/>
+                  </a:ext>
+                </a:extLst>
+              </p:cNvPr>
+              <p:cNvSpPr>
+                <a:spLocks noGrp="1"/>
+              </p:cNvSpPr>
+              <p:nvPr>
+                <p:ph idx="1"/>
+              </p:nvPr>
+            </p:nvSpPr>
+            <p:spPr/>
+            <p:txBody>
+              <a:bodyPr/>
+              <a:lstStyle/>
+              <a:p>
+                <a:pPr>
+                  <a:buFont typeface="Arial" panose="020B0604020202020204" pitchFamily="34" charset="0"/>
+                  <a:buChar char="•"/>
+                </a:pPr>
+                <a:r>
+                  <a:rPr lang="en-US" dirty="0"/>
+                  <a:t> </a:t>
+                </a:r>
+                <a14:m>
+                  <m:oMath xmlns:m="http://schemas.openxmlformats.org/officeDocument/2006/math">
+                    <m:sSub>
+                      <m:sSubPr>
+                        <m:ctrlPr>
+                          <a:rPr lang="en-US" b="0" i="1" smtClean="0">
+                            <a:latin typeface="Cambria Math" panose="02040503050406030204" pitchFamily="18" charset="0"/>
+                          </a:rPr>
+                        </m:ctrlPr>
+                      </m:sSubPr>
+                      <m:e>
+                        <m:r>
+                          <a:rPr lang="en-US" b="0" i="1" smtClean="0">
+                            <a:latin typeface="Cambria Math" panose="02040503050406030204" pitchFamily="18" charset="0"/>
+                          </a:rPr>
+                          <m:t>h</m:t>
+                        </m:r>
+                      </m:e>
+                      <m:sub>
+                        <m:r>
+                          <a:rPr lang="en-US" b="0" i="1" smtClean="0">
+                            <a:latin typeface="Cambria Math" panose="02040503050406030204" pitchFamily="18" charset="0"/>
+                          </a:rPr>
+                          <m:t>𝑡</m:t>
+                        </m:r>
+                      </m:sub>
+                    </m:sSub>
+                    <m:r>
+                      <a:rPr lang="en-US" b="0" i="1" smtClean="0">
+                        <a:latin typeface="Cambria Math" panose="02040503050406030204" pitchFamily="18" charset="0"/>
+                      </a:rPr>
+                      <m:t>=</m:t>
+                    </m:r>
+                    <m:r>
+                      <a:rPr lang="en-US" b="0" i="1" smtClean="0">
+                        <a:latin typeface="Cambria Math" panose="02040503050406030204" pitchFamily="18" charset="0"/>
+                      </a:rPr>
+                      <m:t>𝑔</m:t>
+                    </m:r>
+                    <m:d>
+                      <m:dPr>
+                        <m:ctrlPr>
+                          <a:rPr lang="en-US" b="0" i="1" smtClean="0">
+                            <a:latin typeface="Cambria Math" panose="02040503050406030204" pitchFamily="18" charset="0"/>
+                          </a:rPr>
+                        </m:ctrlPr>
+                      </m:dPr>
+                      <m:e>
+                        <m:r>
+                          <a:rPr lang="en-US" b="0" i="1" smtClean="0">
+                            <a:latin typeface="Cambria Math" panose="02040503050406030204" pitchFamily="18" charset="0"/>
+                          </a:rPr>
+                          <m:t>𝑈</m:t>
+                        </m:r>
+                        <m:sSub>
+                          <m:sSubPr>
+                            <m:ctrlPr>
+                              <a:rPr lang="en-US" b="0" i="1" smtClean="0">
+                                <a:latin typeface="Cambria Math" panose="02040503050406030204" pitchFamily="18" charset="0"/>
+                              </a:rPr>
+                            </m:ctrlPr>
+                          </m:sSubPr>
+                          <m:e>
+                            <m:r>
+                              <a:rPr lang="en-US" b="0" i="1" smtClean="0">
+                                <a:latin typeface="Cambria Math" panose="02040503050406030204" pitchFamily="18" charset="0"/>
+                              </a:rPr>
+                              <m:t>h</m:t>
+                            </m:r>
+                          </m:e>
+                          <m:sub>
+                            <m:r>
+                              <a:rPr lang="en-US" b="0" i="1" smtClean="0">
+                                <a:latin typeface="Cambria Math" panose="02040503050406030204" pitchFamily="18" charset="0"/>
+                              </a:rPr>
+                              <m:t>𝑡</m:t>
+                            </m:r>
+                            <m:r>
+                              <a:rPr lang="en-US" b="0" i="1" smtClean="0">
+                                <a:latin typeface="Cambria Math" panose="02040503050406030204" pitchFamily="18" charset="0"/>
+                              </a:rPr>
+                              <m:t>−1</m:t>
+                            </m:r>
+                          </m:sub>
+                        </m:sSub>
+                        <m:r>
+                          <a:rPr lang="en-US" b="0" i="1" smtClean="0">
+                            <a:latin typeface="Cambria Math" panose="02040503050406030204" pitchFamily="18" charset="0"/>
+                          </a:rPr>
+                          <m:t>+</m:t>
+                        </m:r>
+                        <m:r>
+                          <a:rPr lang="en-US" b="0" i="1" smtClean="0">
+                            <a:latin typeface="Cambria Math" panose="02040503050406030204" pitchFamily="18" charset="0"/>
+                          </a:rPr>
+                          <m:t>𝑊</m:t>
+                        </m:r>
+                        <m:sSub>
+                          <m:sSubPr>
+                            <m:ctrlPr>
+                              <a:rPr lang="en-US" b="0" i="1" smtClean="0">
+                                <a:latin typeface="Cambria Math" panose="02040503050406030204" pitchFamily="18" charset="0"/>
+                              </a:rPr>
+                            </m:ctrlPr>
+                          </m:sSubPr>
+                          <m:e>
+                            <m:r>
+                              <a:rPr lang="en-US" b="0" i="1" smtClean="0">
+                                <a:latin typeface="Cambria Math" panose="02040503050406030204" pitchFamily="18" charset="0"/>
+                              </a:rPr>
+                              <m:t>𝑥</m:t>
+                            </m:r>
+                          </m:e>
+                          <m:sub>
+                            <m:r>
+                              <a:rPr lang="en-US" b="0" i="1" smtClean="0">
+                                <a:latin typeface="Cambria Math" panose="02040503050406030204" pitchFamily="18" charset="0"/>
+                              </a:rPr>
+                              <m:t>𝑡</m:t>
+                            </m:r>
+                          </m:sub>
+                        </m:sSub>
+                      </m:e>
+                    </m:d>
+                    <m:r>
+                      <a:rPr lang="en-US" b="0" i="1" smtClean="0">
+                        <a:latin typeface="Cambria Math" panose="02040503050406030204" pitchFamily="18" charset="0"/>
+                      </a:rPr>
+                      <m:t>, </m:t>
+                    </m:r>
+                    <m:sSub>
+                      <m:sSubPr>
+                        <m:ctrlPr>
+                          <a:rPr lang="en-US" b="0" i="1" smtClean="0">
+                            <a:latin typeface="Cambria Math" panose="02040503050406030204" pitchFamily="18" charset="0"/>
+                          </a:rPr>
+                        </m:ctrlPr>
+                      </m:sSubPr>
+                      <m:e>
+                        <m:r>
+                          <a:rPr lang="en-US" b="0" i="1" smtClean="0">
+                            <a:latin typeface="Cambria Math" panose="02040503050406030204" pitchFamily="18" charset="0"/>
+                          </a:rPr>
+                          <m:t>  </m:t>
+                        </m:r>
+                        <m:r>
+                          <a:rPr lang="en-US" b="0" i="1" smtClean="0">
+                            <a:latin typeface="Cambria Math" panose="02040503050406030204" pitchFamily="18" charset="0"/>
+                          </a:rPr>
+                          <m:t>𝑦</m:t>
+                        </m:r>
+                      </m:e>
+                      <m:sub>
+                        <m:r>
+                          <a:rPr lang="en-US" b="0" i="1" smtClean="0">
+                            <a:latin typeface="Cambria Math" panose="02040503050406030204" pitchFamily="18" charset="0"/>
+                          </a:rPr>
+                          <m:t>𝑡</m:t>
+                        </m:r>
+                      </m:sub>
+                    </m:sSub>
+                    <m:r>
+                      <a:rPr lang="en-US" b="0" i="1" smtClean="0">
+                        <a:latin typeface="Cambria Math" panose="02040503050406030204" pitchFamily="18" charset="0"/>
+                      </a:rPr>
+                      <m:t>=</m:t>
+                    </m:r>
+                    <m:r>
+                      <a:rPr lang="en-US" b="0" i="1" smtClean="0">
+                        <a:latin typeface="Cambria Math" panose="02040503050406030204" pitchFamily="18" charset="0"/>
+                      </a:rPr>
+                      <m:t>𝑓</m:t>
+                    </m:r>
+                    <m:r>
+                      <a:rPr lang="en-US" b="0" i="1" smtClean="0">
+                        <a:latin typeface="Cambria Math" panose="02040503050406030204" pitchFamily="18" charset="0"/>
+                      </a:rPr>
+                      <m:t>(</m:t>
+                    </m:r>
+                    <m:r>
+                      <a:rPr lang="en-US" b="0" i="1" smtClean="0">
+                        <a:latin typeface="Cambria Math" panose="02040503050406030204" pitchFamily="18" charset="0"/>
+                      </a:rPr>
+                      <m:t>𝑉</m:t>
+                    </m:r>
+                    <m:sSub>
+                      <m:sSubPr>
+                        <m:ctrlPr>
+                          <a:rPr lang="en-US" b="0" i="1" smtClean="0">
+                            <a:latin typeface="Cambria Math" panose="02040503050406030204" pitchFamily="18" charset="0"/>
+                          </a:rPr>
+                        </m:ctrlPr>
+                      </m:sSubPr>
+                      <m:e>
+                        <m:r>
+                          <a:rPr lang="en-US" b="0" i="1" smtClean="0">
+                            <a:latin typeface="Cambria Math" panose="02040503050406030204" pitchFamily="18" charset="0"/>
+                          </a:rPr>
+                          <m:t>h</m:t>
+                        </m:r>
+                      </m:e>
+                      <m:sub>
+                        <m:r>
+                          <a:rPr lang="en-US" b="0" i="1" smtClean="0">
+                            <a:latin typeface="Cambria Math" panose="02040503050406030204" pitchFamily="18" charset="0"/>
+                          </a:rPr>
+                          <m:t>𝑡</m:t>
+                        </m:r>
+                      </m:sub>
+                    </m:sSub>
+                    <m:r>
+                      <a:rPr lang="en-US" b="0" i="1" smtClean="0">
+                        <a:latin typeface="Cambria Math" panose="02040503050406030204" pitchFamily="18" charset="0"/>
+                      </a:rPr>
+                      <m:t>)</m:t>
+                    </m:r>
+                  </m:oMath>
+                </a14:m>
+                <a:endParaRPr lang="en-US" b="0" dirty="0"/>
+              </a:p>
+              <a:p>
+                <a:pPr>
+                  <a:buFont typeface="Arial" panose="020B0604020202020204" pitchFamily="34" charset="0"/>
+                  <a:buChar char="•"/>
+                </a:pPr>
+                <a:r>
+                  <a:rPr lang="en-US" dirty="0"/>
+                  <a:t> </a:t>
+                </a:r>
+                <a14:m>
+                  <m:oMath xmlns:m="http://schemas.openxmlformats.org/officeDocument/2006/math">
+                    <m:r>
+                      <a:rPr lang="en-US" b="0" i="1" smtClean="0">
+                        <a:latin typeface="Cambria Math" panose="02040503050406030204" pitchFamily="18" charset="0"/>
+                      </a:rPr>
+                      <m:t>𝑓</m:t>
+                    </m:r>
+                  </m:oMath>
+                </a14:m>
+                <a:r>
+                  <a:rPr lang="en-US" b="0" dirty="0"/>
+                  <a:t> is a </a:t>
+                </a:r>
+                <a:r>
+                  <a:rPr lang="en-US" b="0" dirty="0" err="1"/>
+                  <a:t>softmax</a:t>
+                </a:r>
+                <a:r>
+                  <a:rPr lang="en-US" b="0" dirty="0"/>
+                  <a:t> over </a:t>
+                </a:r>
+                <a:r>
+                  <a:rPr lang="en-US" dirty="0"/>
+                  <a:t>the set of possible outputs</a:t>
+                </a:r>
+              </a:p>
+              <a:p>
+                <a:pPr>
+                  <a:buFont typeface="Arial" panose="020B0604020202020204" pitchFamily="34" charset="0"/>
+                  <a:buChar char="•"/>
+                </a:pPr>
+                <a:r>
+                  <a:rPr lang="en-US" b="0" dirty="0"/>
+                  <a:t> To generate text:</a:t>
+                </a:r>
+              </a:p>
+              <a:p>
+                <a:pPr lvl="1">
+                  <a:buFont typeface="Arial" panose="020B0604020202020204" pitchFamily="34" charset="0"/>
+                  <a:buChar char="•"/>
+                </a:pPr>
+                <a:r>
+                  <a:rPr lang="en-US" sz="2000" dirty="0"/>
+                  <a:t>first randomly sampling a word as the beginning of a sequence</a:t>
+                </a:r>
+              </a:p>
+              <a:p>
+                <a:pPr lvl="1">
+                  <a:buFont typeface="Arial" panose="020B0604020202020204" pitchFamily="34" charset="0"/>
+                  <a:buChar char="•"/>
+                </a:pPr>
+                <a:r>
+                  <a:rPr lang="en-US" sz="2000" dirty="0"/>
+                  <a:t>then condition the generation of subsequent words on the hidden state from the previous time step and the word just generated</a:t>
+                </a:r>
+              </a:p>
+              <a:p>
+                <a:pPr lvl="1">
+                  <a:buFont typeface="Arial" panose="020B0604020202020204" pitchFamily="34" charset="0"/>
+                  <a:buChar char="•"/>
+                </a:pPr>
+                <a:r>
+                  <a:rPr lang="en-US" sz="2000" dirty="0"/>
+                  <a:t>process continues until the end of sentence token &lt;\s&gt; is generated</a:t>
+                </a:r>
+              </a:p>
+              <a:p>
+                <a:pPr>
+                  <a:buFont typeface="Arial" panose="020B0604020202020204" pitchFamily="34" charset="0"/>
+                  <a:buChar char="•"/>
+                </a:pPr>
+                <a:r>
+                  <a:rPr lang="en-US" sz="2200" dirty="0"/>
+                  <a:t> What about generating from a specified prefix?</a:t>
+                </a:r>
+              </a:p>
+              <a:p>
+                <a:pPr>
+                  <a:buFont typeface="Arial" panose="020B0604020202020204" pitchFamily="34" charset="0"/>
+                  <a:buChar char="•"/>
+                </a:pPr>
+                <a:endParaRPr lang="en-US" dirty="0"/>
+              </a:p>
+            </p:txBody>
+          </p:sp>
+        </mc:Choice>
+        <mc:Fallback xmlns="">
+          <p:sp>
+            <p:nvSpPr>
+              <p:cNvPr id="3" name="Content Placeholder 2">
+                <a:extLst>
+                  <a:ext uri="{FF2B5EF4-FFF2-40B4-BE49-F238E27FC236}">
+                    <a16:creationId xmlns:a16="http://schemas.microsoft.com/office/drawing/2014/main" id="{28A97F07-5183-48E2-ABAE-7EE6C9949FBE}"/>
+                  </a:ext>
+                </a:extLst>
+              </p:cNvPr>
+              <p:cNvSpPr>
+                <a:spLocks noGrp="1" noRot="1" noChangeAspect="1" noMove="1" noResize="1" noEditPoints="1" noAdjustHandles="1" noChangeArrowheads="1" noChangeShapeType="1" noTextEdit="1"/>
+              </p:cNvSpPr>
+              <p:nvPr>
+                <p:ph idx="1"/>
+              </p:nvPr>
+            </p:nvSpPr>
+            <p:spPr>
+              <a:blipFill>
+                <a:blip r:embed="rId2"/>
+                <a:stretch>
+                  <a:fillRect l="-2100" t="-1364"/>
+                </a:stretch>
+              </a:blipFill>
+            </p:spPr>
+            <p:txBody>
+              <a:bodyPr/>
+              <a:lstStyle/>
+              <a:p>
+                <a:r>
+                  <a:rPr lang="en-US">
+                    <a:noFill/>
+                  </a:rPr>
+                  <a:t> </a:t>
+                </a:r>
+              </a:p>
+            </p:txBody>
+          </p:sp>
+        </mc:Fallback>
+      </mc:AlternateContent>
+    </p:spTree>
+    <p:extLst>
+      <p:ext uri="{BB962C8B-B14F-4D97-AF65-F5344CB8AC3E}">
+        <p14:creationId xmlns:p14="http://schemas.microsoft.com/office/powerpoint/2010/main" val="3977993595"/>
+      </p:ext>
+    </p:extLst>
+  </p:cSld>
+  <p:clrMapOvr>
+    <a:masterClrMapping/>
+  </p:clrMapOvr>
+</p:sld>
+</file>
+
+<file path=ppt/slides/slide3.xml><?xml version="1.0" encoding="utf-8"?>
+<p:sld xmlns:a="http://schemas.openxmlformats.org/drawingml/2006/main" xmlns:r="http://schemas.openxmlformats.org/officeDocument/2006/relationships" xmlns:p="http://schemas.openxmlformats.org/presentationml/2006/main">
+  <p:cSld>
+    <p:spTree>
+      <p:nvGrpSpPr>
+        <p:cNvPr id="1" name=""/>
+        <p:cNvGrpSpPr/>
+        <p:nvPr/>
+      </p:nvGrpSpPr>
+      <p:grpSpPr>
+        <a:xfrm>
+          <a:off x="0" y="0"/>
+          <a:ext cx="0" cy="0"/>
+          <a:chOff x="0" y="0"/>
+          <a:chExt cx="0" cy="0"/>
+        </a:xfrm>
+      </p:grpSpPr>
+      <p:sp>
+        <p:nvSpPr>
+          <p:cNvPr id="2" name="Title 1">
+            <a:extLst>
+              <a:ext uri="{FF2B5EF4-FFF2-40B4-BE49-F238E27FC236}">
+                <a16:creationId xmlns:a16="http://schemas.microsoft.com/office/drawing/2014/main" id="{F9118119-3BFF-4EFE-8169-BAA7FD94D9C6}"/>
+              </a:ext>
+            </a:extLst>
+          </p:cNvPr>
+          <p:cNvSpPr>
+            <a:spLocks noGrp="1"/>
+          </p:cNvSpPr>
+          <p:nvPr>
+            <p:ph type="title"/>
+          </p:nvPr>
+        </p:nvSpPr>
+        <p:spPr/>
+        <p:txBody>
+          <a:bodyPr/>
+          <a:lstStyle/>
+          <a:p>
+            <a:r>
+              <a:rPr lang="en-US" dirty="0"/>
+              <a:t>Generation with prefix</a:t>
+            </a:r>
+          </a:p>
+        </p:txBody>
+      </p:sp>
+      <p:pic>
+        <p:nvPicPr>
+          <p:cNvPr id="4" name="Picture 3">
+            <a:extLst>
+              <a:ext uri="{FF2B5EF4-FFF2-40B4-BE49-F238E27FC236}">
+                <a16:creationId xmlns:a16="http://schemas.microsoft.com/office/drawing/2014/main" id="{28951595-8679-46AC-A7C0-65F2E0FB86DF}"/>
+              </a:ext>
+            </a:extLst>
+          </p:cNvPr>
+          <p:cNvPicPr>
+            <a:picLocks noChangeAspect="1"/>
+          </p:cNvPicPr>
+          <p:nvPr/>
+        </p:nvPicPr>
+        <p:blipFill>
+          <a:blip r:embed="rId2"/>
+          <a:stretch>
+            <a:fillRect/>
+          </a:stretch>
+        </p:blipFill>
+        <p:spPr>
+          <a:xfrm>
+            <a:off x="533400" y="2438400"/>
+            <a:ext cx="8370747" cy="3980596"/>
+          </a:xfrm>
+          <a:prstGeom prst="rect">
+            <a:avLst/>
+          </a:prstGeom>
+        </p:spPr>
+      </p:pic>
+    </p:spTree>
+    <p:extLst>
+      <p:ext uri="{BB962C8B-B14F-4D97-AF65-F5344CB8AC3E}">
+        <p14:creationId xmlns:p14="http://schemas.microsoft.com/office/powerpoint/2010/main" val="3594029747"/>
+      </p:ext>
+    </p:extLst>
+  </p:cSld>
+  <p:clrMapOvr>
+    <a:masterClrMapping/>
+  </p:clrMapOvr>
+</p:sld>
+</file>
+
+<file path=ppt/slides/slide4.xml><?xml version="1.0" encoding="utf-8"?>
+<p:sld xmlns:a="http://schemas.openxmlformats.org/drawingml/2006/main" xmlns:r="http://schemas.openxmlformats.org/officeDocument/2006/relationships" xmlns:p="http://schemas.openxmlformats.org/presentationml/2006/main">
+  <p:cSld>
+    <p:spTree>
+      <p:nvGrpSpPr>
+        <p:cNvPr id="1" name=""/>
+        <p:cNvGrpSpPr/>
+        <p:nvPr/>
+      </p:nvGrpSpPr>
+      <p:grpSpPr>
+        <a:xfrm>
+          <a:off x="0" y="0"/>
+          <a:ext cx="0" cy="0"/>
+          <a:chOff x="0" y="0"/>
+          <a:chExt cx="0" cy="0"/>
+        </a:xfrm>
+      </p:grpSpPr>
+      <p:sp>
+        <p:nvSpPr>
+          <p:cNvPr id="2" name="Title 1">
+            <a:extLst>
+              <a:ext uri="{FF2B5EF4-FFF2-40B4-BE49-F238E27FC236}">
+                <a16:creationId xmlns:a16="http://schemas.microsoft.com/office/drawing/2014/main" id="{F9118119-3BFF-4EFE-8169-BAA7FD94D9C6}"/>
+              </a:ext>
+            </a:extLst>
+          </p:cNvPr>
+          <p:cNvSpPr>
+            <a:spLocks noGrp="1"/>
+          </p:cNvSpPr>
+          <p:nvPr>
+            <p:ph type="title"/>
+          </p:nvPr>
+        </p:nvSpPr>
+        <p:spPr/>
+        <p:txBody>
+          <a:bodyPr/>
+          <a:lstStyle/>
+          <a:p>
+            <a:r>
+              <a:rPr lang="en-US" dirty="0"/>
+              <a:t>Machine translation</a:t>
+            </a:r>
+          </a:p>
+        </p:txBody>
+      </p:sp>
+      <p:pic>
+        <p:nvPicPr>
+          <p:cNvPr id="3" name="Picture 2">
+            <a:extLst>
+              <a:ext uri="{FF2B5EF4-FFF2-40B4-BE49-F238E27FC236}">
+                <a16:creationId xmlns:a16="http://schemas.microsoft.com/office/drawing/2014/main" id="{E0672859-B6D5-4A18-94DB-AFEED7C14120}"/>
+              </a:ext>
+            </a:extLst>
+          </p:cNvPr>
+          <p:cNvPicPr>
+            <a:picLocks noChangeAspect="1"/>
+          </p:cNvPicPr>
+          <p:nvPr/>
+        </p:nvPicPr>
+        <p:blipFill>
+          <a:blip r:embed="rId2"/>
+          <a:stretch>
+            <a:fillRect/>
+          </a:stretch>
+        </p:blipFill>
+        <p:spPr>
+          <a:xfrm>
+            <a:off x="381000" y="1905000"/>
+            <a:ext cx="8610600" cy="4782024"/>
+          </a:xfrm>
+          <a:prstGeom prst="rect">
+            <a:avLst/>
+          </a:prstGeom>
+        </p:spPr>
+      </p:pic>
+    </p:spTree>
+    <p:extLst>
+      <p:ext uri="{BB962C8B-B14F-4D97-AF65-F5344CB8AC3E}">
+        <p14:creationId xmlns:p14="http://schemas.microsoft.com/office/powerpoint/2010/main" val="1228970700"/>
+      </p:ext>
+    </p:extLst>
+  </p:cSld>
+  <p:clrMapOvr>
+    <a:masterClrMapping/>
+  </p:clrMapOvr>
+</p:sld>
+</file>
+
+<file path=ppt/slides/slide5.xml><?xml version="1.0" encoding="utf-8"?>
+<p:sld xmlns:a="http://schemas.openxmlformats.org/drawingml/2006/main" xmlns:r="http://schemas.openxmlformats.org/officeDocument/2006/relationships" xmlns:p="http://schemas.openxmlformats.org/presentationml/2006/main">
+  <p:cSld>
+    <p:spTree>
+      <p:nvGrpSpPr>
+        <p:cNvPr id="1" name=""/>
+        <p:cNvGrpSpPr/>
+        <p:nvPr/>
+      </p:nvGrpSpPr>
+      <p:grpSpPr>
+        <a:xfrm>
+          <a:off x="0" y="0"/>
+          <a:ext cx="0" cy="0"/>
+          <a:chOff x="0" y="0"/>
+          <a:chExt cx="0" cy="0"/>
+        </a:xfrm>
+      </p:grpSpPr>
+      <p:sp>
+        <p:nvSpPr>
+          <p:cNvPr id="2" name="Title 1">
+            <a:extLst>
+              <a:ext uri="{FF2B5EF4-FFF2-40B4-BE49-F238E27FC236}">
+                <a16:creationId xmlns:a16="http://schemas.microsoft.com/office/drawing/2014/main" id="{A449ACEA-48EE-45A8-8A52-09C7115AC51F}"/>
+              </a:ext>
+            </a:extLst>
+          </p:cNvPr>
+          <p:cNvSpPr>
+            <a:spLocks noGrp="1"/>
+          </p:cNvSpPr>
+          <p:nvPr>
+            <p:ph type="title"/>
+          </p:nvPr>
+        </p:nvSpPr>
+        <p:spPr/>
+        <p:txBody>
+          <a:bodyPr/>
+          <a:lstStyle/>
+          <a:p>
+            <a:r>
+              <a:rPr lang="en-US" dirty="0"/>
+              <a:t>Encoder-decoder networks</a:t>
+            </a:r>
+          </a:p>
+        </p:txBody>
+      </p:sp>
+      <p:pic>
+        <p:nvPicPr>
+          <p:cNvPr id="4" name="Picture 3">
+            <a:extLst>
+              <a:ext uri="{FF2B5EF4-FFF2-40B4-BE49-F238E27FC236}">
+                <a16:creationId xmlns:a16="http://schemas.microsoft.com/office/drawing/2014/main" id="{511A8BFF-4A10-4680-9B07-90112E055B83}"/>
+              </a:ext>
+            </a:extLst>
+          </p:cNvPr>
+          <p:cNvPicPr>
+            <a:picLocks noChangeAspect="1"/>
+          </p:cNvPicPr>
+          <p:nvPr/>
+        </p:nvPicPr>
+        <p:blipFill>
+          <a:blip r:embed="rId2"/>
+          <a:stretch>
+            <a:fillRect/>
+          </a:stretch>
+        </p:blipFill>
+        <p:spPr>
+          <a:xfrm>
+            <a:off x="304800" y="2209800"/>
+            <a:ext cx="8665009" cy="4135403"/>
+          </a:xfrm>
+          <a:prstGeom prst="rect">
+            <a:avLst/>
+          </a:prstGeom>
+        </p:spPr>
+      </p:pic>
+    </p:spTree>
+    <p:extLst>
+      <p:ext uri="{BB962C8B-B14F-4D97-AF65-F5344CB8AC3E}">
+        <p14:creationId xmlns:p14="http://schemas.microsoft.com/office/powerpoint/2010/main" val="3416399009"/>
+      </p:ext>
+    </p:extLst>
+  </p:cSld>
+  <p:clrMapOvr>
+    <a:masterClrMapping/>
+  </p:clrMapOvr>
+</p:sld>
+</file>
+
+<file path=ppt/slides/slide6.xml><?xml version="1.0" encoding="utf-8"?>
+<p:sld xmlns:a="http://schemas.openxmlformats.org/drawingml/2006/main" xmlns:r="http://schemas.openxmlformats.org/officeDocument/2006/relationships" xmlns:p="http://schemas.openxmlformats.org/presentationml/2006/main">
+  <p:cSld>
+    <p:spTree>
+      <p:nvGrpSpPr>
+        <p:cNvPr id="1" name=""/>
+        <p:cNvGrpSpPr/>
+        <p:nvPr/>
+      </p:nvGrpSpPr>
+      <p:grpSpPr>
+        <a:xfrm>
+          <a:off x="0" y="0"/>
+          <a:ext cx="0" cy="0"/>
+          <a:chOff x="0" y="0"/>
+          <a:chExt cx="0" cy="0"/>
+        </a:xfrm>
+      </p:grpSpPr>
+      <p:pic>
+        <p:nvPicPr>
+          <p:cNvPr id="4" name="Picture 3">
+            <a:extLst>
+              <a:ext uri="{FF2B5EF4-FFF2-40B4-BE49-F238E27FC236}">
+                <a16:creationId xmlns:a16="http://schemas.microsoft.com/office/drawing/2014/main" id="{4387ECEF-E76C-4DCC-AC6B-1624AC29F09D}"/>
+              </a:ext>
+            </a:extLst>
+          </p:cNvPr>
+          <p:cNvPicPr>
+            <a:picLocks noChangeAspect="1"/>
+          </p:cNvPicPr>
+          <p:nvPr/>
+        </p:nvPicPr>
+        <p:blipFill>
+          <a:blip r:embed="rId2"/>
+          <a:stretch>
+            <a:fillRect/>
+          </a:stretch>
+        </p:blipFill>
+        <p:spPr>
+          <a:xfrm>
+            <a:off x="1066800" y="3960235"/>
+            <a:ext cx="7010400" cy="2611161"/>
+          </a:xfrm>
+          <a:prstGeom prst="rect">
+            <a:avLst/>
+          </a:prstGeom>
+        </p:spPr>
+      </p:pic>
+      <p:sp>
+        <p:nvSpPr>
+          <p:cNvPr id="2" name="Title 1">
+            <a:extLst>
+              <a:ext uri="{FF2B5EF4-FFF2-40B4-BE49-F238E27FC236}">
+                <a16:creationId xmlns:a16="http://schemas.microsoft.com/office/drawing/2014/main" id="{75E683B2-A3DE-4215-92F3-FB887192E9EC}"/>
+              </a:ext>
+            </a:extLst>
+          </p:cNvPr>
+          <p:cNvSpPr>
+            <a:spLocks noGrp="1"/>
+          </p:cNvSpPr>
+          <p:nvPr>
+            <p:ph type="title"/>
+          </p:nvPr>
+        </p:nvSpPr>
+        <p:spPr/>
+        <p:txBody>
+          <a:bodyPr/>
+          <a:lstStyle/>
+          <a:p>
+            <a:r>
+              <a:rPr lang="en-US" dirty="0"/>
+              <a:t>Encoder-decoder networks</a:t>
+            </a:r>
+          </a:p>
+        </p:txBody>
+      </p:sp>
+      <p:sp>
+        <p:nvSpPr>
+          <p:cNvPr id="3" name="Content Placeholder 2">
+            <a:extLst>
+              <a:ext uri="{FF2B5EF4-FFF2-40B4-BE49-F238E27FC236}">
+                <a16:creationId xmlns:a16="http://schemas.microsoft.com/office/drawing/2014/main" id="{C4E48657-A5A5-4161-B038-AF87A0948BD8}"/>
+              </a:ext>
+            </a:extLst>
+          </p:cNvPr>
+          <p:cNvSpPr>
+            <a:spLocks noGrp="1"/>
+          </p:cNvSpPr>
+          <p:nvPr>
+            <p:ph idx="1"/>
+          </p:nvPr>
+        </p:nvSpPr>
+        <p:spPr/>
+        <p:txBody>
+          <a:bodyPr/>
+          <a:lstStyle/>
+          <a:p>
+            <a:pPr>
+              <a:buFont typeface="Arial" panose="020B0604020202020204" pitchFamily="34" charset="0"/>
+              <a:buChar char="•"/>
+            </a:pPr>
+            <a:r>
+              <a:rPr lang="en-US" dirty="0"/>
+              <a:t> An encoder that accepts an input sequence and generates a corresponding sequence of contextualized representations</a:t>
+            </a:r>
+          </a:p>
+          <a:p>
+            <a:pPr>
+              <a:buFont typeface="Arial" panose="020B0604020202020204" pitchFamily="34" charset="0"/>
+              <a:buChar char="•"/>
+            </a:pPr>
+            <a:r>
+              <a:rPr lang="en-US" dirty="0"/>
+              <a:t> A context vector that conveys the essence of the input to the decoder</a:t>
+            </a:r>
+          </a:p>
+          <a:p>
+            <a:pPr>
+              <a:buFont typeface="Arial" panose="020B0604020202020204" pitchFamily="34" charset="0"/>
+              <a:buChar char="•"/>
+            </a:pPr>
+            <a:r>
+              <a:rPr lang="en-US" dirty="0"/>
+              <a:t> A decoder, which accepts context vector as input and generates an arbitrary length sequence of hidden states, from which a corresponding sequence of output states can be obtained</a:t>
+            </a:r>
+          </a:p>
+        </p:txBody>
+      </p:sp>
+    </p:spTree>
+    <p:extLst>
+      <p:ext uri="{BB962C8B-B14F-4D97-AF65-F5344CB8AC3E}">
+        <p14:creationId xmlns:p14="http://schemas.microsoft.com/office/powerpoint/2010/main" val="4128021882"/>
+      </p:ext>
+    </p:extLst>
+  </p:cSld>
+  <p:clrMapOvr>
+    <a:masterClrMapping/>
+  </p:clrMapOvr>
+</p:sld>
+</file>
+
+<file path=ppt/slides/slide7.xml><?xml version="1.0" encoding="utf-8"?>
+<p:sld xmlns:a="http://schemas.openxmlformats.org/drawingml/2006/main" xmlns:r="http://schemas.openxmlformats.org/officeDocument/2006/relationships" xmlns:p="http://schemas.openxmlformats.org/presentationml/2006/main">
+  <p:cSld>
+    <p:spTree>
+      <p:nvGrpSpPr>
+        <p:cNvPr id="1" name=""/>
+        <p:cNvGrpSpPr/>
+        <p:nvPr/>
+      </p:nvGrpSpPr>
+      <p:grpSpPr>
+        <a:xfrm>
+          <a:off x="0" y="0"/>
+          <a:ext cx="0" cy="0"/>
+          <a:chOff x="0" y="0"/>
+          <a:chExt cx="0" cy="0"/>
+        </a:xfrm>
+      </p:grpSpPr>
+      <p:sp>
+        <p:nvSpPr>
+          <p:cNvPr id="2" name="Title 1">
+            <a:extLst>
+              <a:ext uri="{FF2B5EF4-FFF2-40B4-BE49-F238E27FC236}">
+                <a16:creationId xmlns:a16="http://schemas.microsoft.com/office/drawing/2014/main" id="{B2B54682-0D3E-475D-9DB6-0FB5831D2AFF}"/>
+              </a:ext>
+            </a:extLst>
+          </p:cNvPr>
+          <p:cNvSpPr>
+            <a:spLocks noGrp="1"/>
+          </p:cNvSpPr>
+          <p:nvPr>
+            <p:ph type="title"/>
+          </p:nvPr>
+        </p:nvSpPr>
+        <p:spPr/>
+        <p:txBody>
+          <a:bodyPr/>
+          <a:lstStyle/>
+          <a:p>
+            <a:r>
+              <a:rPr lang="en-US" dirty="0"/>
+              <a:t>Encoder-decoder: specifics</a:t>
+            </a:r>
+          </a:p>
+        </p:txBody>
+      </p:sp>
+      <p:sp>
+        <p:nvSpPr>
+          <p:cNvPr id="3" name="Content Placeholder 2">
+            <a:extLst>
+              <a:ext uri="{FF2B5EF4-FFF2-40B4-BE49-F238E27FC236}">
+                <a16:creationId xmlns:a16="http://schemas.microsoft.com/office/drawing/2014/main" id="{76B5B4A0-22C4-4E64-8BB8-9F68A06213AD}"/>
+              </a:ext>
+            </a:extLst>
+          </p:cNvPr>
+          <p:cNvSpPr>
+            <a:spLocks noGrp="1"/>
+          </p:cNvSpPr>
+          <p:nvPr>
+            <p:ph idx="1"/>
+          </p:nvPr>
+        </p:nvSpPr>
+        <p:spPr/>
+        <p:txBody>
+          <a:bodyPr/>
+          <a:lstStyle/>
+          <a:p>
+            <a:r>
+              <a:rPr lang="en-US" dirty="0"/>
+              <a:t>Encoder and decoder choices: simple RNNs, LSTMs, GRUs, convolutional networks, transformers, stacked Bi-LSTMs, etc.</a:t>
+            </a:r>
+          </a:p>
+          <a:p>
+            <a:r>
+              <a:rPr lang="en-US" dirty="0"/>
+              <a:t>Beam search:</a:t>
+            </a:r>
+          </a:p>
+          <a:p>
+            <a:pPr>
+              <a:buFont typeface="Arial" panose="020B0604020202020204" pitchFamily="34" charset="0"/>
+              <a:buChar char="•"/>
+            </a:pPr>
+            <a:r>
+              <a:rPr lang="en-US" dirty="0"/>
+              <a:t> In decoding, can we explore several possible outputs?</a:t>
+            </a:r>
+          </a:p>
+          <a:p>
+            <a:pPr>
+              <a:buFont typeface="Arial" panose="020B0604020202020204" pitchFamily="34" charset="0"/>
+              <a:buChar char="•"/>
+            </a:pPr>
+            <a:r>
+              <a:rPr lang="en-US" dirty="0"/>
+              <a:t> Beam search: combining a breadth-first-search strategy with a heuristic filter that scores each option and prunes the search space to stay within a fixed-size memory footprint, called the beam width</a:t>
+            </a:r>
+          </a:p>
+          <a:p>
+            <a:endParaRPr lang="en-US" dirty="0"/>
+          </a:p>
+        </p:txBody>
+      </p:sp>
+    </p:spTree>
+    <p:extLst>
+      <p:ext uri="{BB962C8B-B14F-4D97-AF65-F5344CB8AC3E}">
+        <p14:creationId xmlns:p14="http://schemas.microsoft.com/office/powerpoint/2010/main" val="248548139"/>
+      </p:ext>
+    </p:extLst>
+  </p:cSld>
+  <p:clrMapOvr>
+    <a:masterClrMapping/>
+  </p:clrMapOvr>
+</p:sld>
+</file>
+
+<file path=ppt/slides/slide8.xml><?xml version="1.0" encoding="utf-8"?>
+<p:sld xmlns:a="http://schemas.openxmlformats.org/drawingml/2006/main" xmlns:r="http://schemas.openxmlformats.org/officeDocument/2006/relationships" xmlns:p="http://schemas.openxmlformats.org/presentationml/2006/main">
+  <p:cSld>
+    <p:spTree>
+      <p:nvGrpSpPr>
+        <p:cNvPr id="1" name=""/>
+        <p:cNvGrpSpPr/>
+        <p:nvPr/>
+      </p:nvGrpSpPr>
+      <p:grpSpPr>
+        <a:xfrm>
+          <a:off x="0" y="0"/>
+          <a:ext cx="0" cy="0"/>
+          <a:chOff x="0" y="0"/>
+          <a:chExt cx="0" cy="0"/>
+        </a:xfrm>
+      </p:grpSpPr>
+      <p:sp>
+        <p:nvSpPr>
+          <p:cNvPr id="2" name="Title 1">
+            <a:extLst>
+              <a:ext uri="{FF2B5EF4-FFF2-40B4-BE49-F238E27FC236}">
+                <a16:creationId xmlns:a16="http://schemas.microsoft.com/office/drawing/2014/main" id="{E9080397-8AC5-4FAE-A761-05C9025D171C}"/>
+              </a:ext>
+            </a:extLst>
+          </p:cNvPr>
+          <p:cNvSpPr>
+            <a:spLocks noGrp="1"/>
+          </p:cNvSpPr>
+          <p:nvPr>
+            <p:ph type="title"/>
+          </p:nvPr>
+        </p:nvSpPr>
+        <p:spPr/>
+        <p:txBody>
+          <a:bodyPr/>
+          <a:lstStyle/>
+          <a:p>
+            <a:r>
+              <a:rPr lang="en-US" dirty="0"/>
+              <a:t>Beam search</a:t>
+            </a:r>
+          </a:p>
+        </p:txBody>
+      </p:sp>
+      <p:pic>
+        <p:nvPicPr>
+          <p:cNvPr id="4" name="Content Placeholder 3">
+            <a:extLst>
+              <a:ext uri="{FF2B5EF4-FFF2-40B4-BE49-F238E27FC236}">
+                <a16:creationId xmlns:a16="http://schemas.microsoft.com/office/drawing/2014/main" id="{3E3FFA12-9233-42E2-8122-6820465EB606}"/>
+              </a:ext>
+            </a:extLst>
+          </p:cNvPr>
+          <p:cNvPicPr>
+            <a:picLocks noGrp="1" noChangeAspect="1"/>
+          </p:cNvPicPr>
+          <p:nvPr>
+            <p:ph idx="1"/>
+          </p:nvPr>
+        </p:nvPicPr>
+        <p:blipFill>
+          <a:blip r:embed="rId2"/>
+          <a:stretch>
+            <a:fillRect/>
+          </a:stretch>
+        </p:blipFill>
+        <p:spPr>
+          <a:xfrm>
+            <a:off x="381000" y="1746886"/>
+            <a:ext cx="8494345" cy="4511039"/>
+          </a:xfrm>
+          <a:prstGeom prst="rect">
+            <a:avLst/>
+          </a:prstGeom>
+        </p:spPr>
+      </p:pic>
+    </p:spTree>
+    <p:extLst>
+      <p:ext uri="{BB962C8B-B14F-4D97-AF65-F5344CB8AC3E}">
+        <p14:creationId xmlns:p14="http://schemas.microsoft.com/office/powerpoint/2010/main" val="1973818303"/>
+      </p:ext>
+    </p:extLst>
+  </p:cSld>
+  <p:clrMapOvr>
+    <a:masterClrMapping/>
+  </p:clrMapOvr>
+</p:sld>
+</file>
+
+<file path=ppt/slides/slide9.xml><?xml version="1.0" encoding="utf-8"?>
+<p:sld xmlns:a="http://schemas.openxmlformats.org/drawingml/2006/main" xmlns:r="http://schemas.openxmlformats.org/officeDocument/2006/relationships" xmlns:p="http://schemas.openxmlformats.org/presentationml/2006/main">
+  <p:cSld>
+    <p:spTree>
+      <p:nvGrpSpPr>
+        <p:cNvPr id="1" name=""/>
+        <p:cNvGrpSpPr/>
+        <p:nvPr/>
+      </p:nvGrpSpPr>
+      <p:grpSpPr>
+        <a:xfrm>
+          <a:off x="0" y="0"/>
+          <a:ext cx="0" cy="0"/>
+          <a:chOff x="0" y="0"/>
+          <a:chExt cx="0" cy="0"/>
+        </a:xfrm>
+      </p:grpSpPr>
+      <p:sp>
+        <p:nvSpPr>
+          <p:cNvPr id="2" name="Title 1">
+            <a:extLst>
+              <a:ext uri="{FF2B5EF4-FFF2-40B4-BE49-F238E27FC236}">
+                <a16:creationId xmlns:a16="http://schemas.microsoft.com/office/drawing/2014/main" id="{27175624-B301-4327-9A28-886E670F4A6E}"/>
+              </a:ext>
+            </a:extLst>
+          </p:cNvPr>
+          <p:cNvSpPr>
+            <a:spLocks noGrp="1"/>
+          </p:cNvSpPr>
+          <p:nvPr>
+            <p:ph type="title"/>
+          </p:nvPr>
+        </p:nvSpPr>
+        <p:spPr/>
+        <p:txBody>
+          <a:bodyPr/>
+          <a:lstStyle/>
+          <a:p>
+            <a:r>
+              <a:rPr lang="en-US" dirty="0"/>
+              <a:t>Attention</a:t>
+            </a:r>
+          </a:p>
+        </p:txBody>
+      </p:sp>
+      <p:sp>
+        <p:nvSpPr>
+          <p:cNvPr id="3" name="Content Placeholder 2">
+            <a:extLst>
+              <a:ext uri="{FF2B5EF4-FFF2-40B4-BE49-F238E27FC236}">
+                <a16:creationId xmlns:a16="http://schemas.microsoft.com/office/drawing/2014/main" id="{2FFEF93A-ECB8-4CAC-A2DC-A061517D5E5B}"/>
+              </a:ext>
+            </a:extLst>
+          </p:cNvPr>
+          <p:cNvSpPr>
+            <a:spLocks noGrp="1"/>
+          </p:cNvSpPr>
+          <p:nvPr>
+            <p:ph idx="1"/>
+          </p:nvPr>
+        </p:nvSpPr>
+        <p:spPr/>
+        <p:txBody>
+          <a:bodyPr/>
+          <a:lstStyle/>
+          <a:p>
+            <a:pPr marL="0" indent="0">
+              <a:buNone/>
+            </a:pPr>
+            <a:r>
+              <a:rPr lang="en-US" dirty="0"/>
+              <a:t>Weaknesses of the context vector:</a:t>
+            </a:r>
+          </a:p>
+          <a:p>
+            <a:pPr>
+              <a:buFont typeface="Arial" panose="020B0604020202020204" pitchFamily="34" charset="0"/>
+              <a:buChar char="•"/>
+            </a:pPr>
+            <a:r>
+              <a:rPr lang="en-US" dirty="0"/>
+              <a:t> Only directly available at the beginning of the process and its influence will wane as the output sequence is generated</a:t>
+            </a:r>
+          </a:p>
+          <a:p>
+            <a:pPr>
+              <a:buFont typeface="Arial" panose="020B0604020202020204" pitchFamily="34" charset="0"/>
+              <a:buChar char="•"/>
+            </a:pPr>
+            <a:r>
+              <a:rPr lang="en-US" dirty="0"/>
+              <a:t> Context vector is a function (e.g. last, average, max, concatenation) of the hidden states of the encoder. This approach loses useful information about each of the individual encoder states</a:t>
+            </a:r>
+          </a:p>
+          <a:p>
+            <a:pPr>
+              <a:buFont typeface="Arial" panose="020B0604020202020204" pitchFamily="34" charset="0"/>
+              <a:buChar char="•"/>
+            </a:pPr>
+            <a:endParaRPr lang="en-US" dirty="0"/>
+          </a:p>
+          <a:p>
+            <a:pPr marL="0" indent="0">
+              <a:buNone/>
+            </a:pPr>
+            <a:r>
+              <a:rPr lang="en-US" dirty="0"/>
+              <a:t>Potential solution: </a:t>
+            </a:r>
+            <a:r>
+              <a:rPr lang="en-US" b="1" dirty="0"/>
+              <a:t>attention mechanism</a:t>
+            </a:r>
+          </a:p>
+        </p:txBody>
+      </p:sp>
+    </p:spTree>
+    <p:extLst>
+      <p:ext uri="{BB962C8B-B14F-4D97-AF65-F5344CB8AC3E}">
+        <p14:creationId xmlns:p14="http://schemas.microsoft.com/office/powerpoint/2010/main" val="3823740428"/>
       </p:ext>
     </p:extLst>
   </p:cSld>

</xml_diff>